<commit_message>
Organizando a pasta e imagens
</commit_message>
<xml_diff>
--- a/Rascunhos/Imagens IST.pptx
+++ b/Rascunhos/Imagens IST.pptx
@@ -294,7 +294,7 @@
           <a:p>
             <a:fld id="{2F6A3928-CD8C-4FF1-B681-57F85D420AA4}" type="datetimeFigureOut">
               <a:rPr lang="pt-BR" smtClean="0"/>
-              <a:t>01/03/2019</a:t>
+              <a:t>08/03/2019</a:t>
             </a:fld>
             <a:endParaRPr lang="pt-BR"/>
           </a:p>
@@ -464,7 +464,7 @@
           <a:p>
             <a:fld id="{2F6A3928-CD8C-4FF1-B681-57F85D420AA4}" type="datetimeFigureOut">
               <a:rPr lang="pt-BR" smtClean="0"/>
-              <a:t>01/03/2019</a:t>
+              <a:t>08/03/2019</a:t>
             </a:fld>
             <a:endParaRPr lang="pt-BR"/>
           </a:p>
@@ -644,7 +644,7 @@
           <a:p>
             <a:fld id="{2F6A3928-CD8C-4FF1-B681-57F85D420AA4}" type="datetimeFigureOut">
               <a:rPr lang="pt-BR" smtClean="0"/>
-              <a:t>01/03/2019</a:t>
+              <a:t>08/03/2019</a:t>
             </a:fld>
             <a:endParaRPr lang="pt-BR"/>
           </a:p>
@@ -814,7 +814,7 @@
           <a:p>
             <a:fld id="{2F6A3928-CD8C-4FF1-B681-57F85D420AA4}" type="datetimeFigureOut">
               <a:rPr lang="pt-BR" smtClean="0"/>
-              <a:t>01/03/2019</a:t>
+              <a:t>08/03/2019</a:t>
             </a:fld>
             <a:endParaRPr lang="pt-BR"/>
           </a:p>
@@ -1060,7 +1060,7 @@
           <a:p>
             <a:fld id="{2F6A3928-CD8C-4FF1-B681-57F85D420AA4}" type="datetimeFigureOut">
               <a:rPr lang="pt-BR" smtClean="0"/>
-              <a:t>01/03/2019</a:t>
+              <a:t>08/03/2019</a:t>
             </a:fld>
             <a:endParaRPr lang="pt-BR"/>
           </a:p>
@@ -1348,7 +1348,7 @@
           <a:p>
             <a:fld id="{2F6A3928-CD8C-4FF1-B681-57F85D420AA4}" type="datetimeFigureOut">
               <a:rPr lang="pt-BR" smtClean="0"/>
-              <a:t>01/03/2019</a:t>
+              <a:t>08/03/2019</a:t>
             </a:fld>
             <a:endParaRPr lang="pt-BR"/>
           </a:p>
@@ -1770,7 +1770,7 @@
           <a:p>
             <a:fld id="{2F6A3928-CD8C-4FF1-B681-57F85D420AA4}" type="datetimeFigureOut">
               <a:rPr lang="pt-BR" smtClean="0"/>
-              <a:t>01/03/2019</a:t>
+              <a:t>08/03/2019</a:t>
             </a:fld>
             <a:endParaRPr lang="pt-BR"/>
           </a:p>
@@ -1888,7 +1888,7 @@
           <a:p>
             <a:fld id="{2F6A3928-CD8C-4FF1-B681-57F85D420AA4}" type="datetimeFigureOut">
               <a:rPr lang="pt-BR" smtClean="0"/>
-              <a:t>01/03/2019</a:t>
+              <a:t>08/03/2019</a:t>
             </a:fld>
             <a:endParaRPr lang="pt-BR"/>
           </a:p>
@@ -1983,7 +1983,7 @@
           <a:p>
             <a:fld id="{2F6A3928-CD8C-4FF1-B681-57F85D420AA4}" type="datetimeFigureOut">
               <a:rPr lang="pt-BR" smtClean="0"/>
-              <a:t>01/03/2019</a:t>
+              <a:t>08/03/2019</a:t>
             </a:fld>
             <a:endParaRPr lang="pt-BR"/>
           </a:p>
@@ -2260,7 +2260,7 @@
           <a:p>
             <a:fld id="{2F6A3928-CD8C-4FF1-B681-57F85D420AA4}" type="datetimeFigureOut">
               <a:rPr lang="pt-BR" smtClean="0"/>
-              <a:t>01/03/2019</a:t>
+              <a:t>08/03/2019</a:t>
             </a:fld>
             <a:endParaRPr lang="pt-BR"/>
           </a:p>
@@ -2513,7 +2513,7 @@
           <a:p>
             <a:fld id="{2F6A3928-CD8C-4FF1-B681-57F85D420AA4}" type="datetimeFigureOut">
               <a:rPr lang="pt-BR" smtClean="0"/>
-              <a:t>01/03/2019</a:t>
+              <a:t>08/03/2019</a:t>
             </a:fld>
             <a:endParaRPr lang="pt-BR"/>
           </a:p>
@@ -2726,7 +2726,7 @@
           <a:p>
             <a:fld id="{2F6A3928-CD8C-4FF1-B681-57F85D420AA4}" type="datetimeFigureOut">
               <a:rPr lang="pt-BR" smtClean="0"/>
-              <a:t>01/03/2019</a:t>
+              <a:t>08/03/2019</a:t>
             </a:fld>
             <a:endParaRPr lang="pt-BR"/>
           </a:p>
@@ -3087,6 +3087,17 @@
 <file path=ppt/slides/slide1.xml><?xml version="1.0" encoding="utf-8"?>
 <p:sld xmlns:a="http://schemas.openxmlformats.org/drawingml/2006/main" xmlns:r="http://schemas.openxmlformats.org/officeDocument/2006/relationships" xmlns:p="http://schemas.openxmlformats.org/presentationml/2006/main">
   <p:cSld>
+    <p:bg>
+      <p:bgPr>
+        <a:solidFill>
+          <a:schemeClr val="tx1">
+            <a:lumMod val="85000"/>
+            <a:lumOff val="15000"/>
+          </a:schemeClr>
+        </a:solidFill>
+        <a:effectLst/>
+      </p:bgPr>
+    </p:bg>
     <p:spTree>
       <p:nvGrpSpPr>
         <p:cNvPr id="1" name=""/>
@@ -3124,927 +3135,8 @@
         </p:blipFill>
         <p:spPr bwMode="auto">
           <a:xfrm>
-            <a:off x="4932040" y="398103"/>
+            <a:off x="6228184" y="-436494"/>
             <a:ext cx="5040560" cy="3362998"/>
-          </a:xfrm>
-          <a:prstGeom prst="rect">
-            <a:avLst/>
-          </a:prstGeom>
-          <a:noFill/>
-          <a:ln>
-            <a:noFill/>
-          </a:ln>
-          <a:extLst>
-            <a:ext uri="{909E8E84-426E-40DD-AFC4-6F175D3DCCD1}">
-              <a14:hiddenFill xmlns:a14="http://schemas.microsoft.com/office/drawing/2010/main">
-                <a:solidFill>
-                  <a:schemeClr val="accent1"/>
-                </a:solidFill>
-              </a14:hiddenFill>
-            </a:ext>
-            <a:ext uri="{91240B29-F687-4F45-9708-019B960494DF}">
-              <a14:hiddenLine xmlns:a14="http://schemas.microsoft.com/office/drawing/2010/main" w="9525">
-                <a:solidFill>
-                  <a:schemeClr val="tx1"/>
-                </a:solidFill>
-                <a:miter lim="800000"/>
-                <a:headEnd/>
-                <a:tailEnd/>
-              </a14:hiddenLine>
-            </a:ext>
-          </a:extLst>
-        </p:spPr>
-      </p:pic>
-      <p:sp>
-        <p:nvSpPr>
-          <p:cNvPr id="2" name="CaixaDeTexto 1"/>
-          <p:cNvSpPr txBox="1"/>
-          <p:nvPr/>
-        </p:nvSpPr>
-        <p:spPr>
-          <a:xfrm>
-            <a:off x="873018" y="692696"/>
-            <a:ext cx="540533" cy="830997"/>
-          </a:xfrm>
-          <a:prstGeom prst="rect">
-            <a:avLst/>
-          </a:prstGeom>
-          <a:noFill/>
-        </p:spPr>
-        <p:txBody>
-          <a:bodyPr wrap="none" rtlCol="0">
-            <a:spAutoFit/>
-          </a:bodyPr>
-          <a:lstStyle/>
-          <a:p>
-            <a:r>
-              <a:rPr lang="pt-BR" sz="4800" dirty="0" smtClean="0"/>
-              <a:t>A</a:t>
-            </a:r>
-            <a:endParaRPr lang="pt-BR" sz="4800" dirty="0"/>
-          </a:p>
-        </p:txBody>
-      </p:sp>
-      <p:sp>
-        <p:nvSpPr>
-          <p:cNvPr id="4" name="Retângulo 3"/>
-          <p:cNvSpPr/>
-          <p:nvPr/>
-        </p:nvSpPr>
-        <p:spPr>
-          <a:xfrm>
-            <a:off x="1691680" y="4149080"/>
-            <a:ext cx="288032" cy="576064"/>
-          </a:xfrm>
-          <a:prstGeom prst="rect">
-            <a:avLst/>
-          </a:prstGeom>
-          <a:solidFill>
-            <a:srgbClr val="C00000"/>
-          </a:solidFill>
-          <a:ln>
-            <a:noFill/>
-          </a:ln>
-        </p:spPr>
-        <p:style>
-          <a:lnRef idx="2">
-            <a:schemeClr val="accent1">
-              <a:shade val="50000"/>
-            </a:schemeClr>
-          </a:lnRef>
-          <a:fillRef idx="1">
-            <a:schemeClr val="accent1"/>
-          </a:fillRef>
-          <a:effectRef idx="0">
-            <a:schemeClr val="accent1"/>
-          </a:effectRef>
-          <a:fontRef idx="minor">
-            <a:schemeClr val="lt1"/>
-          </a:fontRef>
-        </p:style>
-        <p:txBody>
-          <a:bodyPr rtlCol="0" anchor="ctr"/>
-          <a:lstStyle/>
-          <a:p>
-            <a:pPr algn="ctr"/>
-            <a:endParaRPr lang="pt-BR"/>
-          </a:p>
-        </p:txBody>
-      </p:sp>
-      <p:sp>
-        <p:nvSpPr>
-          <p:cNvPr id="5" name="Retângulo 4"/>
-          <p:cNvSpPr/>
-          <p:nvPr/>
-        </p:nvSpPr>
-        <p:spPr>
-          <a:xfrm>
-            <a:off x="3203848" y="4149080"/>
-            <a:ext cx="288032" cy="576064"/>
-          </a:xfrm>
-          <a:prstGeom prst="rect">
-            <a:avLst/>
-          </a:prstGeom>
-          <a:solidFill>
-            <a:srgbClr val="C00000"/>
-          </a:solidFill>
-          <a:ln>
-            <a:noFill/>
-          </a:ln>
-        </p:spPr>
-        <p:style>
-          <a:lnRef idx="2">
-            <a:schemeClr val="accent1">
-              <a:shade val="50000"/>
-            </a:schemeClr>
-          </a:lnRef>
-          <a:fillRef idx="1">
-            <a:schemeClr val="accent1"/>
-          </a:fillRef>
-          <a:effectRef idx="0">
-            <a:schemeClr val="accent1"/>
-          </a:effectRef>
-          <a:fontRef idx="minor">
-            <a:schemeClr val="lt1"/>
-          </a:fontRef>
-        </p:style>
-        <p:txBody>
-          <a:bodyPr rtlCol="0" anchor="ctr"/>
-          <a:lstStyle/>
-          <a:p>
-            <a:pPr algn="ctr"/>
-            <a:endParaRPr lang="pt-BR"/>
-          </a:p>
-        </p:txBody>
-      </p:sp>
-      <p:sp>
-        <p:nvSpPr>
-          <p:cNvPr id="6" name="Retângulo de cantos arredondados 5"/>
-          <p:cNvSpPr/>
-          <p:nvPr/>
-        </p:nvSpPr>
-        <p:spPr>
-          <a:xfrm>
-            <a:off x="1259632" y="3645024"/>
-            <a:ext cx="2636628" cy="720080"/>
-          </a:xfrm>
-          <a:prstGeom prst="roundRect">
-            <a:avLst/>
-          </a:prstGeom>
-          <a:solidFill>
-            <a:srgbClr val="C00000"/>
-          </a:solidFill>
-          <a:ln>
-            <a:noFill/>
-          </a:ln>
-        </p:spPr>
-        <p:style>
-          <a:lnRef idx="2">
-            <a:schemeClr val="accent1">
-              <a:shade val="50000"/>
-            </a:schemeClr>
-          </a:lnRef>
-          <a:fillRef idx="1">
-            <a:schemeClr val="accent1"/>
-          </a:fillRef>
-          <a:effectRef idx="0">
-            <a:schemeClr val="accent1"/>
-          </a:effectRef>
-          <a:fontRef idx="minor">
-            <a:schemeClr val="lt1"/>
-          </a:fontRef>
-        </p:style>
-        <p:txBody>
-          <a:bodyPr rtlCol="0" anchor="ctr"/>
-          <a:lstStyle/>
-          <a:p>
-            <a:pPr algn="ctr"/>
-            <a:endParaRPr lang="pt-BR"/>
-          </a:p>
-        </p:txBody>
-      </p:sp>
-      <p:sp>
-        <p:nvSpPr>
-          <p:cNvPr id="9" name="Retângulo 8"/>
-          <p:cNvSpPr/>
-          <p:nvPr/>
-        </p:nvSpPr>
-        <p:spPr>
-          <a:xfrm rot="1039746">
-            <a:off x="1492495" y="2429001"/>
-            <a:ext cx="144016" cy="1359387"/>
-          </a:xfrm>
-          <a:prstGeom prst="rect">
-            <a:avLst/>
-          </a:prstGeom>
-          <a:solidFill>
-            <a:srgbClr val="C00000"/>
-          </a:solidFill>
-          <a:ln>
-            <a:noFill/>
-          </a:ln>
-        </p:spPr>
-        <p:style>
-          <a:lnRef idx="2">
-            <a:schemeClr val="accent1">
-              <a:shade val="50000"/>
-            </a:schemeClr>
-          </a:lnRef>
-          <a:fillRef idx="1">
-            <a:schemeClr val="accent1"/>
-          </a:fillRef>
-          <a:effectRef idx="0">
-            <a:schemeClr val="accent1"/>
-          </a:effectRef>
-          <a:fontRef idx="minor">
-            <a:schemeClr val="lt1"/>
-          </a:fontRef>
-        </p:style>
-        <p:txBody>
-          <a:bodyPr rtlCol="0" anchor="ctr"/>
-          <a:lstStyle/>
-          <a:p>
-            <a:pPr algn="ctr"/>
-            <a:endParaRPr lang="pt-BR"/>
-          </a:p>
-        </p:txBody>
-      </p:sp>
-      <p:sp>
-        <p:nvSpPr>
-          <p:cNvPr id="10" name="Retângulo 9"/>
-          <p:cNvSpPr/>
-          <p:nvPr/>
-        </p:nvSpPr>
-        <p:spPr>
-          <a:xfrm rot="20560254" flipH="1">
-            <a:off x="3485087" y="2429001"/>
-            <a:ext cx="144016" cy="1359387"/>
-          </a:xfrm>
-          <a:prstGeom prst="rect">
-            <a:avLst/>
-          </a:prstGeom>
-          <a:solidFill>
-            <a:srgbClr val="C00000"/>
-          </a:solidFill>
-          <a:ln>
-            <a:noFill/>
-          </a:ln>
-        </p:spPr>
-        <p:style>
-          <a:lnRef idx="2">
-            <a:schemeClr val="accent1">
-              <a:shade val="50000"/>
-            </a:schemeClr>
-          </a:lnRef>
-          <a:fillRef idx="1">
-            <a:schemeClr val="accent1"/>
-          </a:fillRef>
-          <a:effectRef idx="0">
-            <a:schemeClr val="accent1"/>
-          </a:effectRef>
-          <a:fontRef idx="minor">
-            <a:schemeClr val="lt1"/>
-          </a:fontRef>
-        </p:style>
-        <p:txBody>
-          <a:bodyPr rtlCol="0" anchor="ctr"/>
-          <a:lstStyle/>
-          <a:p>
-            <a:pPr algn="ctr"/>
-            <a:endParaRPr lang="pt-BR"/>
-          </a:p>
-        </p:txBody>
-      </p:sp>
-      <p:sp>
-        <p:nvSpPr>
-          <p:cNvPr id="11" name="Retângulo 10"/>
-          <p:cNvSpPr/>
-          <p:nvPr/>
-        </p:nvSpPr>
-        <p:spPr>
-          <a:xfrm rot="5400000">
-            <a:off x="2483767" y="1646317"/>
-            <a:ext cx="144016" cy="1728191"/>
-          </a:xfrm>
-          <a:prstGeom prst="rect">
-            <a:avLst/>
-          </a:prstGeom>
-          <a:solidFill>
-            <a:srgbClr val="C00000"/>
-          </a:solidFill>
-          <a:ln>
-            <a:noFill/>
-          </a:ln>
-        </p:spPr>
-        <p:style>
-          <a:lnRef idx="2">
-            <a:schemeClr val="accent1">
-              <a:shade val="50000"/>
-            </a:schemeClr>
-          </a:lnRef>
-          <a:fillRef idx="1">
-            <a:schemeClr val="accent1"/>
-          </a:fillRef>
-          <a:effectRef idx="0">
-            <a:schemeClr val="accent1"/>
-          </a:effectRef>
-          <a:fontRef idx="minor">
-            <a:schemeClr val="lt1"/>
-          </a:fontRef>
-        </p:style>
-        <p:txBody>
-          <a:bodyPr rtlCol="0" anchor="ctr"/>
-          <a:lstStyle/>
-          <a:p>
-            <a:pPr algn="ctr"/>
-            <a:endParaRPr lang="pt-BR"/>
-          </a:p>
-        </p:txBody>
-      </p:sp>
-      <p:sp>
-        <p:nvSpPr>
-          <p:cNvPr id="13" name="Retângulo de cantos arredondados 12"/>
-          <p:cNvSpPr/>
-          <p:nvPr/>
-        </p:nvSpPr>
-        <p:spPr>
-          <a:xfrm>
-            <a:off x="1728873" y="1726431"/>
-            <a:ext cx="1658566" cy="777946"/>
-          </a:xfrm>
-          <a:custGeom>
-            <a:avLst/>
-            <a:gdLst>
-              <a:gd name="connsiteX0" fmla="*/ 0 w 1656185"/>
-              <a:gd name="connsiteY0" fmla="*/ 214375 h 737596"/>
-              <a:gd name="connsiteX1" fmla="*/ 214375 w 1656185"/>
-              <a:gd name="connsiteY1" fmla="*/ 0 h 737596"/>
-              <a:gd name="connsiteX2" fmla="*/ 1441810 w 1656185"/>
-              <a:gd name="connsiteY2" fmla="*/ 0 h 737596"/>
-              <a:gd name="connsiteX3" fmla="*/ 1656185 w 1656185"/>
-              <a:gd name="connsiteY3" fmla="*/ 214375 h 737596"/>
-              <a:gd name="connsiteX4" fmla="*/ 1656185 w 1656185"/>
-              <a:gd name="connsiteY4" fmla="*/ 523221 h 737596"/>
-              <a:gd name="connsiteX5" fmla="*/ 1441810 w 1656185"/>
-              <a:gd name="connsiteY5" fmla="*/ 737596 h 737596"/>
-              <a:gd name="connsiteX6" fmla="*/ 214375 w 1656185"/>
-              <a:gd name="connsiteY6" fmla="*/ 737596 h 737596"/>
-              <a:gd name="connsiteX7" fmla="*/ 0 w 1656185"/>
-              <a:gd name="connsiteY7" fmla="*/ 523221 h 737596"/>
-              <a:gd name="connsiteX8" fmla="*/ 0 w 1656185"/>
-              <a:gd name="connsiteY8" fmla="*/ 214375 h 737596"/>
-              <a:gd name="connsiteX0" fmla="*/ 2381 w 1658566"/>
-              <a:gd name="connsiteY0" fmla="*/ 214375 h 788413"/>
-              <a:gd name="connsiteX1" fmla="*/ 216756 w 1658566"/>
-              <a:gd name="connsiteY1" fmla="*/ 0 h 788413"/>
-              <a:gd name="connsiteX2" fmla="*/ 1444191 w 1658566"/>
-              <a:gd name="connsiteY2" fmla="*/ 0 h 788413"/>
-              <a:gd name="connsiteX3" fmla="*/ 1658566 w 1658566"/>
-              <a:gd name="connsiteY3" fmla="*/ 214375 h 788413"/>
-              <a:gd name="connsiteX4" fmla="*/ 1658566 w 1658566"/>
-              <a:gd name="connsiteY4" fmla="*/ 523221 h 788413"/>
-              <a:gd name="connsiteX5" fmla="*/ 1444191 w 1658566"/>
-              <a:gd name="connsiteY5" fmla="*/ 737596 h 788413"/>
-              <a:gd name="connsiteX6" fmla="*/ 216756 w 1658566"/>
-              <a:gd name="connsiteY6" fmla="*/ 737596 h 788413"/>
-              <a:gd name="connsiteX7" fmla="*/ 0 w 1658566"/>
-              <a:gd name="connsiteY7" fmla="*/ 735152 h 788413"/>
-              <a:gd name="connsiteX8" fmla="*/ 2381 w 1658566"/>
-              <a:gd name="connsiteY8" fmla="*/ 214375 h 788413"/>
-              <a:gd name="connsiteX0" fmla="*/ 2381 w 1658566"/>
-              <a:gd name="connsiteY0" fmla="*/ 214375 h 777946"/>
-              <a:gd name="connsiteX1" fmla="*/ 216756 w 1658566"/>
-              <a:gd name="connsiteY1" fmla="*/ 0 h 777946"/>
-              <a:gd name="connsiteX2" fmla="*/ 1444191 w 1658566"/>
-              <a:gd name="connsiteY2" fmla="*/ 0 h 777946"/>
-              <a:gd name="connsiteX3" fmla="*/ 1658566 w 1658566"/>
-              <a:gd name="connsiteY3" fmla="*/ 214375 h 777946"/>
-              <a:gd name="connsiteX4" fmla="*/ 1658566 w 1658566"/>
-              <a:gd name="connsiteY4" fmla="*/ 523221 h 777946"/>
-              <a:gd name="connsiteX5" fmla="*/ 1444191 w 1658566"/>
-              <a:gd name="connsiteY5" fmla="*/ 737596 h 777946"/>
-              <a:gd name="connsiteX6" fmla="*/ 216756 w 1658566"/>
-              <a:gd name="connsiteY6" fmla="*/ 737596 h 777946"/>
-              <a:gd name="connsiteX7" fmla="*/ 42777 w 1658566"/>
-              <a:gd name="connsiteY7" fmla="*/ 740544 h 777946"/>
-              <a:gd name="connsiteX8" fmla="*/ 0 w 1658566"/>
-              <a:gd name="connsiteY8" fmla="*/ 735152 h 777946"/>
-              <a:gd name="connsiteX9" fmla="*/ 2381 w 1658566"/>
-              <a:gd name="connsiteY9" fmla="*/ 214375 h 777946"/>
-              <a:gd name="connsiteX0" fmla="*/ 2381 w 1658566"/>
-              <a:gd name="connsiteY0" fmla="*/ 214375 h 788413"/>
-              <a:gd name="connsiteX1" fmla="*/ 216756 w 1658566"/>
-              <a:gd name="connsiteY1" fmla="*/ 0 h 788413"/>
-              <a:gd name="connsiteX2" fmla="*/ 1444191 w 1658566"/>
-              <a:gd name="connsiteY2" fmla="*/ 0 h 788413"/>
-              <a:gd name="connsiteX3" fmla="*/ 1658566 w 1658566"/>
-              <a:gd name="connsiteY3" fmla="*/ 214375 h 788413"/>
-              <a:gd name="connsiteX4" fmla="*/ 1658566 w 1658566"/>
-              <a:gd name="connsiteY4" fmla="*/ 735152 h 788413"/>
-              <a:gd name="connsiteX5" fmla="*/ 1444191 w 1658566"/>
-              <a:gd name="connsiteY5" fmla="*/ 737596 h 788413"/>
-              <a:gd name="connsiteX6" fmla="*/ 216756 w 1658566"/>
-              <a:gd name="connsiteY6" fmla="*/ 737596 h 788413"/>
-              <a:gd name="connsiteX7" fmla="*/ 42777 w 1658566"/>
-              <a:gd name="connsiteY7" fmla="*/ 740544 h 788413"/>
-              <a:gd name="connsiteX8" fmla="*/ 0 w 1658566"/>
-              <a:gd name="connsiteY8" fmla="*/ 735152 h 788413"/>
-              <a:gd name="connsiteX9" fmla="*/ 2381 w 1658566"/>
-              <a:gd name="connsiteY9" fmla="*/ 214375 h 788413"/>
-              <a:gd name="connsiteX0" fmla="*/ 2381 w 1658566"/>
-              <a:gd name="connsiteY0" fmla="*/ 214375 h 777946"/>
-              <a:gd name="connsiteX1" fmla="*/ 216756 w 1658566"/>
-              <a:gd name="connsiteY1" fmla="*/ 0 h 777946"/>
-              <a:gd name="connsiteX2" fmla="*/ 1444191 w 1658566"/>
-              <a:gd name="connsiteY2" fmla="*/ 0 h 777946"/>
-              <a:gd name="connsiteX3" fmla="*/ 1658566 w 1658566"/>
-              <a:gd name="connsiteY3" fmla="*/ 214375 h 777946"/>
-              <a:gd name="connsiteX4" fmla="*/ 1658566 w 1658566"/>
-              <a:gd name="connsiteY4" fmla="*/ 735152 h 777946"/>
-              <a:gd name="connsiteX5" fmla="*/ 1597733 w 1658566"/>
-              <a:gd name="connsiteY5" fmla="*/ 704825 h 777946"/>
-              <a:gd name="connsiteX6" fmla="*/ 1444191 w 1658566"/>
-              <a:gd name="connsiteY6" fmla="*/ 737596 h 777946"/>
-              <a:gd name="connsiteX7" fmla="*/ 216756 w 1658566"/>
-              <a:gd name="connsiteY7" fmla="*/ 737596 h 777946"/>
-              <a:gd name="connsiteX8" fmla="*/ 42777 w 1658566"/>
-              <a:gd name="connsiteY8" fmla="*/ 740544 h 777946"/>
-              <a:gd name="connsiteX9" fmla="*/ 0 w 1658566"/>
-              <a:gd name="connsiteY9" fmla="*/ 735152 h 777946"/>
-              <a:gd name="connsiteX10" fmla="*/ 2381 w 1658566"/>
-              <a:gd name="connsiteY10" fmla="*/ 214375 h 777946"/>
-              <a:gd name="connsiteX0" fmla="*/ 2381 w 1658566"/>
-              <a:gd name="connsiteY0" fmla="*/ 214375 h 777946"/>
-              <a:gd name="connsiteX1" fmla="*/ 216756 w 1658566"/>
-              <a:gd name="connsiteY1" fmla="*/ 0 h 777946"/>
-              <a:gd name="connsiteX2" fmla="*/ 1444191 w 1658566"/>
-              <a:gd name="connsiteY2" fmla="*/ 0 h 777946"/>
-              <a:gd name="connsiteX3" fmla="*/ 1658566 w 1658566"/>
-              <a:gd name="connsiteY3" fmla="*/ 214375 h 777946"/>
-              <a:gd name="connsiteX4" fmla="*/ 1658566 w 1658566"/>
-              <a:gd name="connsiteY4" fmla="*/ 735152 h 777946"/>
-              <a:gd name="connsiteX5" fmla="*/ 1602496 w 1658566"/>
-              <a:gd name="connsiteY5" fmla="*/ 728638 h 777946"/>
-              <a:gd name="connsiteX6" fmla="*/ 1444191 w 1658566"/>
-              <a:gd name="connsiteY6" fmla="*/ 737596 h 777946"/>
-              <a:gd name="connsiteX7" fmla="*/ 216756 w 1658566"/>
-              <a:gd name="connsiteY7" fmla="*/ 737596 h 777946"/>
-              <a:gd name="connsiteX8" fmla="*/ 42777 w 1658566"/>
-              <a:gd name="connsiteY8" fmla="*/ 740544 h 777946"/>
-              <a:gd name="connsiteX9" fmla="*/ 0 w 1658566"/>
-              <a:gd name="connsiteY9" fmla="*/ 735152 h 777946"/>
-              <a:gd name="connsiteX10" fmla="*/ 2381 w 1658566"/>
-              <a:gd name="connsiteY10" fmla="*/ 214375 h 777946"/>
-              <a:gd name="connsiteX0" fmla="*/ 2381 w 1658566"/>
-              <a:gd name="connsiteY0" fmla="*/ 214375 h 777946"/>
-              <a:gd name="connsiteX1" fmla="*/ 216756 w 1658566"/>
-              <a:gd name="connsiteY1" fmla="*/ 0 h 777946"/>
-              <a:gd name="connsiteX2" fmla="*/ 1444191 w 1658566"/>
-              <a:gd name="connsiteY2" fmla="*/ 0 h 777946"/>
-              <a:gd name="connsiteX3" fmla="*/ 1658566 w 1658566"/>
-              <a:gd name="connsiteY3" fmla="*/ 214375 h 777946"/>
-              <a:gd name="connsiteX4" fmla="*/ 1658566 w 1658566"/>
-              <a:gd name="connsiteY4" fmla="*/ 735152 h 777946"/>
-              <a:gd name="connsiteX5" fmla="*/ 1602496 w 1658566"/>
-              <a:gd name="connsiteY5" fmla="*/ 740545 h 777946"/>
-              <a:gd name="connsiteX6" fmla="*/ 1444191 w 1658566"/>
-              <a:gd name="connsiteY6" fmla="*/ 737596 h 777946"/>
-              <a:gd name="connsiteX7" fmla="*/ 216756 w 1658566"/>
-              <a:gd name="connsiteY7" fmla="*/ 737596 h 777946"/>
-              <a:gd name="connsiteX8" fmla="*/ 42777 w 1658566"/>
-              <a:gd name="connsiteY8" fmla="*/ 740544 h 777946"/>
-              <a:gd name="connsiteX9" fmla="*/ 0 w 1658566"/>
-              <a:gd name="connsiteY9" fmla="*/ 735152 h 777946"/>
-              <a:gd name="connsiteX10" fmla="*/ 2381 w 1658566"/>
-              <a:gd name="connsiteY10" fmla="*/ 214375 h 777946"/>
-            </a:gdLst>
-            <a:ahLst/>
-            <a:cxnLst>
-              <a:cxn ang="0">
-                <a:pos x="connsiteX0" y="connsiteY0"/>
-              </a:cxn>
-              <a:cxn ang="0">
-                <a:pos x="connsiteX1" y="connsiteY1"/>
-              </a:cxn>
-              <a:cxn ang="0">
-                <a:pos x="connsiteX2" y="connsiteY2"/>
-              </a:cxn>
-              <a:cxn ang="0">
-                <a:pos x="connsiteX3" y="connsiteY3"/>
-              </a:cxn>
-              <a:cxn ang="0">
-                <a:pos x="connsiteX4" y="connsiteY4"/>
-              </a:cxn>
-              <a:cxn ang="0">
-                <a:pos x="connsiteX5" y="connsiteY5"/>
-              </a:cxn>
-              <a:cxn ang="0">
-                <a:pos x="connsiteX6" y="connsiteY6"/>
-              </a:cxn>
-              <a:cxn ang="0">
-                <a:pos x="connsiteX7" y="connsiteY7"/>
-              </a:cxn>
-              <a:cxn ang="0">
-                <a:pos x="connsiteX8" y="connsiteY8"/>
-              </a:cxn>
-              <a:cxn ang="0">
-                <a:pos x="connsiteX9" y="connsiteY9"/>
-              </a:cxn>
-              <a:cxn ang="0">
-                <a:pos x="connsiteX10" y="connsiteY10"/>
-              </a:cxn>
-            </a:cxnLst>
-            <a:rect l="l" t="t" r="r" b="b"/>
-            <a:pathLst>
-              <a:path w="1658566" h="777946">
-                <a:moveTo>
-                  <a:pt x="2381" y="214375"/>
-                </a:moveTo>
-                <a:cubicBezTo>
-                  <a:pt x="2381" y="95979"/>
-                  <a:pt x="98360" y="0"/>
-                  <a:pt x="216756" y="0"/>
-                </a:cubicBezTo>
-                <a:lnTo>
-                  <a:pt x="1444191" y="0"/>
-                </a:lnTo>
-                <a:cubicBezTo>
-                  <a:pt x="1562587" y="0"/>
-                  <a:pt x="1658566" y="95979"/>
-                  <a:pt x="1658566" y="214375"/>
-                </a:cubicBezTo>
-                <a:lnTo>
-                  <a:pt x="1658566" y="735152"/>
-                </a:lnTo>
-                <a:cubicBezTo>
-                  <a:pt x="1644459" y="828006"/>
-                  <a:pt x="1638225" y="740138"/>
-                  <a:pt x="1602496" y="740545"/>
-                </a:cubicBezTo>
-                <a:cubicBezTo>
-                  <a:pt x="1566767" y="740952"/>
-                  <a:pt x="1670385" y="743247"/>
-                  <a:pt x="1444191" y="737596"/>
-                </a:cubicBezTo>
-                <a:lnTo>
-                  <a:pt x="216756" y="737596"/>
-                </a:lnTo>
-                <a:lnTo>
-                  <a:pt x="42777" y="740544"/>
-                </a:lnTo>
-                <a:cubicBezTo>
-                  <a:pt x="6651" y="740137"/>
-                  <a:pt x="11495" y="828403"/>
-                  <a:pt x="0" y="735152"/>
-                </a:cubicBezTo>
-                <a:cubicBezTo>
-                  <a:pt x="0" y="632203"/>
-                  <a:pt x="2381" y="317324"/>
-                  <a:pt x="2381" y="214375"/>
-                </a:cubicBezTo>
-                <a:close/>
-              </a:path>
-            </a:pathLst>
-          </a:custGeom>
-          <a:noFill/>
-          <a:ln w="76200">
-            <a:solidFill>
-              <a:srgbClr val="C00000"/>
-            </a:solidFill>
-          </a:ln>
-        </p:spPr>
-        <p:style>
-          <a:lnRef idx="2">
-            <a:schemeClr val="accent1">
-              <a:shade val="50000"/>
-            </a:schemeClr>
-          </a:lnRef>
-          <a:fillRef idx="1">
-            <a:schemeClr val="accent1"/>
-          </a:fillRef>
-          <a:effectRef idx="0">
-            <a:schemeClr val="accent1"/>
-          </a:effectRef>
-          <a:fontRef idx="minor">
-            <a:schemeClr val="lt1"/>
-          </a:fontRef>
-        </p:style>
-        <p:txBody>
-          <a:bodyPr rtlCol="0" anchor="ctr"/>
-          <a:lstStyle/>
-          <a:p>
-            <a:pPr algn="ctr"/>
-            <a:r>
-              <a:rPr lang="pt-BR" dirty="0" smtClean="0"/>
-              <a:t>z</a:t>
-            </a:r>
-            <a:endParaRPr lang="pt-BR" dirty="0"/>
-          </a:p>
-        </p:txBody>
-      </p:sp>
-    </p:spTree>
-    <p:extLst>
-      <p:ext uri="{BB962C8B-B14F-4D97-AF65-F5344CB8AC3E}">
-        <p14:creationId xmlns:p14="http://schemas.microsoft.com/office/powerpoint/2010/main" val="3937181533"/>
-      </p:ext>
-    </p:extLst>
-  </p:cSld>
-  <p:clrMapOvr>
-    <a:masterClrMapping/>
-  </p:clrMapOvr>
-</p:sld>
-</file>
-
-<file path=ppt/slides/slide2.xml><?xml version="1.0" encoding="utf-8"?>
-<p:sld xmlns:a="http://schemas.openxmlformats.org/drawingml/2006/main" xmlns:r="http://schemas.openxmlformats.org/officeDocument/2006/relationships" xmlns:p="http://schemas.openxmlformats.org/presentationml/2006/main">
-  <p:cSld>
-    <p:spTree>
-      <p:nvGrpSpPr>
-        <p:cNvPr id="1" name=""/>
-        <p:cNvGrpSpPr/>
-        <p:nvPr/>
-      </p:nvGrpSpPr>
-      <p:grpSpPr>
-        <a:xfrm>
-          <a:off x="0" y="0"/>
-          <a:ext cx="0" cy="0"/>
-          <a:chOff x="0" y="0"/>
-          <a:chExt cx="0" cy="0"/>
-        </a:xfrm>
-      </p:grpSpPr>
-      <p:sp>
-        <p:nvSpPr>
-          <p:cNvPr id="2" name="CaixaDeTexto 1"/>
-          <p:cNvSpPr txBox="1"/>
-          <p:nvPr/>
-        </p:nvSpPr>
-        <p:spPr>
-          <a:xfrm>
-            <a:off x="971600" y="620688"/>
-            <a:ext cx="436338" cy="646331"/>
-          </a:xfrm>
-          <a:prstGeom prst="rect">
-            <a:avLst/>
-          </a:prstGeom>
-          <a:noFill/>
-        </p:spPr>
-        <p:txBody>
-          <a:bodyPr wrap="none" rtlCol="0">
-            <a:spAutoFit/>
-          </a:bodyPr>
-          <a:lstStyle/>
-          <a:p>
-            <a:r>
-              <a:rPr lang="pt-BR" sz="3600" dirty="0" smtClean="0"/>
-              <a:t>B</a:t>
-            </a:r>
-            <a:endParaRPr lang="pt-BR" sz="3600" dirty="0"/>
-          </a:p>
-        </p:txBody>
-      </p:sp>
-      <p:pic>
-        <p:nvPicPr>
-          <p:cNvPr id="1026" name="Picture 2"/>
-          <p:cNvPicPr>
-            <a:picLocks noChangeAspect="1" noChangeArrowheads="1"/>
-          </p:cNvPicPr>
-          <p:nvPr/>
-        </p:nvPicPr>
-        <p:blipFill>
-          <a:blip r:embed="rId2" cstate="print">
-            <a:extLst>
-              <a:ext uri="{28A0092B-C50C-407E-A947-70E740481C1C}">
-                <a14:useLocalDpi xmlns:a14="http://schemas.microsoft.com/office/drawing/2010/main" val="0"/>
-              </a:ext>
-            </a:extLst>
-          </a:blip>
-          <a:srcRect/>
-          <a:stretch>
-            <a:fillRect/>
-          </a:stretch>
-        </p:blipFill>
-        <p:spPr bwMode="auto">
-          <a:xfrm>
-            <a:off x="467544" y="1484784"/>
-            <a:ext cx="2231529" cy="2231529"/>
-          </a:xfrm>
-          <a:prstGeom prst="rect">
-            <a:avLst/>
-          </a:prstGeom>
-          <a:noFill/>
-          <a:ln>
-            <a:noFill/>
-          </a:ln>
-          <a:extLst>
-            <a:ext uri="{909E8E84-426E-40DD-AFC4-6F175D3DCCD1}">
-              <a14:hiddenFill xmlns:a14="http://schemas.microsoft.com/office/drawing/2010/main">
-                <a:solidFill>
-                  <a:schemeClr val="accent1"/>
-                </a:solidFill>
-              </a14:hiddenFill>
-            </a:ext>
-            <a:ext uri="{91240B29-F687-4F45-9708-019B960494DF}">
-              <a14:hiddenLine xmlns:a14="http://schemas.microsoft.com/office/drawing/2010/main" w="9525">
-                <a:solidFill>
-                  <a:schemeClr val="tx1"/>
-                </a:solidFill>
-                <a:miter lim="800000"/>
-                <a:headEnd/>
-                <a:tailEnd/>
-              </a14:hiddenLine>
-            </a:ext>
-          </a:extLst>
-        </p:spPr>
-      </p:pic>
-      <p:pic>
-        <p:nvPicPr>
-          <p:cNvPr id="1027" name="Picture 3"/>
-          <p:cNvPicPr>
-            <a:picLocks noChangeAspect="1" noChangeArrowheads="1"/>
-          </p:cNvPicPr>
-          <p:nvPr/>
-        </p:nvPicPr>
-        <p:blipFill>
-          <a:blip r:embed="rId3" cstate="print">
-            <a:extLst>
-              <a:ext uri="{28A0092B-C50C-407E-A947-70E740481C1C}">
-                <a14:useLocalDpi xmlns:a14="http://schemas.microsoft.com/office/drawing/2010/main" val="0"/>
-              </a:ext>
-            </a:extLst>
-          </a:blip>
-          <a:srcRect/>
-          <a:stretch>
-            <a:fillRect/>
-          </a:stretch>
-        </p:blipFill>
-        <p:spPr bwMode="auto">
-          <a:xfrm>
-            <a:off x="3131840" y="1290030"/>
-            <a:ext cx="2665015" cy="2665015"/>
-          </a:xfrm>
-          <a:prstGeom prst="rect">
-            <a:avLst/>
-          </a:prstGeom>
-          <a:noFill/>
-          <a:ln>
-            <a:noFill/>
-          </a:ln>
-          <a:extLst>
-            <a:ext uri="{909E8E84-426E-40DD-AFC4-6F175D3DCCD1}">
-              <a14:hiddenFill xmlns:a14="http://schemas.microsoft.com/office/drawing/2010/main">
-                <a:solidFill>
-                  <a:schemeClr val="accent1"/>
-                </a:solidFill>
-              </a14:hiddenFill>
-            </a:ext>
-            <a:ext uri="{91240B29-F687-4F45-9708-019B960494DF}">
-              <a14:hiddenLine xmlns:a14="http://schemas.microsoft.com/office/drawing/2010/main" w="9525">
-                <a:solidFill>
-                  <a:schemeClr val="tx1"/>
-                </a:solidFill>
-                <a:miter lim="800000"/>
-                <a:headEnd/>
-                <a:tailEnd/>
-              </a14:hiddenLine>
-            </a:ext>
-          </a:extLst>
-        </p:spPr>
-      </p:pic>
-    </p:spTree>
-    <p:extLst>
-      <p:ext uri="{BB962C8B-B14F-4D97-AF65-F5344CB8AC3E}">
-        <p14:creationId xmlns:p14="http://schemas.microsoft.com/office/powerpoint/2010/main" val="3571698888"/>
-      </p:ext>
-    </p:extLst>
-  </p:cSld>
-  <p:clrMapOvr>
-    <a:masterClrMapping/>
-  </p:clrMapOvr>
-</p:sld>
-</file>
-
-<file path=ppt/slides/slide3.xml><?xml version="1.0" encoding="utf-8"?>
-<p:sld xmlns:a="http://schemas.openxmlformats.org/drawingml/2006/main" xmlns:r="http://schemas.openxmlformats.org/officeDocument/2006/relationships" xmlns:p="http://schemas.openxmlformats.org/presentationml/2006/main">
-  <p:cSld>
-    <p:spTree>
-      <p:nvGrpSpPr>
-        <p:cNvPr id="1" name=""/>
-        <p:cNvGrpSpPr/>
-        <p:nvPr/>
-      </p:nvGrpSpPr>
-      <p:grpSpPr>
-        <a:xfrm>
-          <a:off x="0" y="0"/>
-          <a:ext cx="0" cy="0"/>
-          <a:chOff x="0" y="0"/>
-          <a:chExt cx="0" cy="0"/>
-        </a:xfrm>
-      </p:grpSpPr>
-      <p:sp>
-        <p:nvSpPr>
-          <p:cNvPr id="15" name="Retângulo de cantos arredondados 14"/>
-          <p:cNvSpPr/>
-          <p:nvPr/>
-        </p:nvSpPr>
-        <p:spPr>
-          <a:xfrm>
-            <a:off x="5928030" y="1944491"/>
-            <a:ext cx="1415872" cy="2498598"/>
-          </a:xfrm>
-          <a:prstGeom prst="roundRect">
-            <a:avLst>
-              <a:gd name="adj" fmla="val 50000"/>
-            </a:avLst>
-          </a:prstGeom>
-          <a:solidFill>
-            <a:schemeClr val="bg1">
-              <a:lumMod val="75000"/>
-            </a:schemeClr>
-          </a:solidFill>
-          <a:ln>
-            <a:noFill/>
-          </a:ln>
-        </p:spPr>
-        <p:style>
-          <a:lnRef idx="2">
-            <a:schemeClr val="accent1">
-              <a:shade val="50000"/>
-            </a:schemeClr>
-          </a:lnRef>
-          <a:fillRef idx="1">
-            <a:schemeClr val="accent1"/>
-          </a:fillRef>
-          <a:effectRef idx="0">
-            <a:schemeClr val="accent1"/>
-          </a:effectRef>
-          <a:fontRef idx="minor">
-            <a:schemeClr val="lt1"/>
-          </a:fontRef>
-        </p:style>
-        <p:txBody>
-          <a:bodyPr rtlCol="0" anchor="ctr"/>
-          <a:lstStyle/>
-          <a:p>
-            <a:pPr algn="ctr"/>
-            <a:endParaRPr lang="pt-BR"/>
-          </a:p>
-        </p:txBody>
-      </p:sp>
-      <p:sp>
-        <p:nvSpPr>
-          <p:cNvPr id="4" name="CaixaDeTexto 3"/>
-          <p:cNvSpPr txBox="1"/>
-          <p:nvPr/>
-        </p:nvSpPr>
-        <p:spPr>
-          <a:xfrm>
-            <a:off x="971600" y="620688"/>
-            <a:ext cx="535724" cy="646331"/>
-          </a:xfrm>
-          <a:prstGeom prst="rect">
-            <a:avLst/>
-          </a:prstGeom>
-          <a:noFill/>
-        </p:spPr>
-        <p:txBody>
-          <a:bodyPr wrap="none" rtlCol="0">
-            <a:spAutoFit/>
-          </a:bodyPr>
-          <a:lstStyle/>
-          <a:p>
-            <a:r>
-              <a:rPr lang="pt-BR" sz="3600" dirty="0" smtClean="0"/>
-              <a:t>C </a:t>
-            </a:r>
-            <a:endParaRPr lang="pt-BR" sz="3600" dirty="0"/>
-          </a:p>
-        </p:txBody>
-      </p:sp>
-      <p:pic>
-        <p:nvPicPr>
-          <p:cNvPr id="2051" name="Picture 3"/>
-          <p:cNvPicPr>
-            <a:picLocks noChangeAspect="1" noChangeArrowheads="1"/>
-          </p:cNvPicPr>
-          <p:nvPr/>
-        </p:nvPicPr>
-        <p:blipFill>
-          <a:blip r:embed="rId2" cstate="print">
-            <a:extLst>
-              <a:ext uri="{28A0092B-C50C-407E-A947-70E740481C1C}">
-                <a14:useLocalDpi xmlns:a14="http://schemas.microsoft.com/office/drawing/2010/main" val="0"/>
-              </a:ext>
-            </a:extLst>
-          </a:blip>
-          <a:srcRect/>
-          <a:stretch>
-            <a:fillRect/>
-          </a:stretch>
-        </p:blipFill>
-        <p:spPr bwMode="auto">
-          <a:xfrm>
-            <a:off x="755576" y="1340768"/>
-            <a:ext cx="3706044" cy="3706044"/>
           </a:xfrm>
           <a:prstGeom prst="rect">
             <a:avLst/>
@@ -4076,73 +3168,1335 @@
       </p:pic>
       <p:grpSp>
         <p:nvGrpSpPr>
-          <p:cNvPr id="10" name="Grupo 9"/>
+          <p:cNvPr id="30" name="Grupo 29"/>
           <p:cNvGrpSpPr/>
           <p:nvPr/>
         </p:nvGrpSpPr>
         <p:grpSpPr>
           <a:xfrm>
-            <a:off x="4855379" y="3573016"/>
-            <a:ext cx="3674153" cy="991154"/>
-            <a:chOff x="4570081" y="2780928"/>
-            <a:chExt cx="3674153" cy="703122"/>
+            <a:off x="-2841857" y="667107"/>
+            <a:ext cx="3779912" cy="3779912"/>
+            <a:chOff x="-297876" y="1196752"/>
+            <a:chExt cx="5112568" cy="5112568"/>
           </a:xfrm>
         </p:grpSpPr>
         <p:sp>
           <p:nvSpPr>
-            <p:cNvPr id="3" name="Elipse 2"/>
+            <p:cNvPr id="29" name="Elipse 28"/>
             <p:cNvSpPr/>
             <p:nvPr/>
           </p:nvSpPr>
           <p:spPr>
             <a:xfrm>
-              <a:off x="4570081" y="2924944"/>
-              <a:ext cx="1076491" cy="559106"/>
+              <a:off x="-297876" y="1196752"/>
+              <a:ext cx="5112568" cy="5112568"/>
             </a:xfrm>
-            <a:custGeom>
+            <a:prstGeom prst="ellipse">
               <a:avLst/>
-              <a:gdLst/>
-              <a:ahLst/>
-              <a:cxnLst/>
-              <a:rect l="l" t="t" r="r" b="b"/>
-              <a:pathLst>
-                <a:path w="1076491" h="559106">
-                  <a:moveTo>
-                    <a:pt x="1920" y="521014"/>
-                  </a:moveTo>
-                  <a:lnTo>
-                    <a:pt x="1920" y="559106"/>
-                  </a:lnTo>
-                  <a:cubicBezTo>
-                    <a:pt x="111" y="552821"/>
-                    <a:pt x="0" y="546454"/>
-                    <a:pt x="0" y="540060"/>
-                  </a:cubicBezTo>
-                  <a:close/>
-                  <a:moveTo>
-                    <a:pt x="540060" y="0"/>
-                  </a:moveTo>
-                  <a:cubicBezTo>
-                    <a:pt x="826174" y="0"/>
-                    <a:pt x="1060323" y="222491"/>
-                    <a:pt x="1076491" y="504056"/>
-                  </a:cubicBezTo>
-                  <a:lnTo>
-                    <a:pt x="3630" y="504056"/>
-                  </a:lnTo>
-                  <a:cubicBezTo>
-                    <a:pt x="19798" y="222491"/>
-                    <a:pt x="253946" y="0"/>
-                    <a:pt x="540060" y="0"/>
-                  </a:cubicBezTo>
-                  <a:close/>
-                </a:path>
-              </a:pathLst>
-            </a:custGeom>
+            </a:prstGeom>
+            <a:ln>
+              <a:noFill/>
+            </a:ln>
+          </p:spPr>
+          <p:style>
+            <a:lnRef idx="2">
+              <a:schemeClr val="accent1">
+                <a:shade val="50000"/>
+              </a:schemeClr>
+            </a:lnRef>
+            <a:fillRef idx="1">
+              <a:schemeClr val="accent1"/>
+            </a:fillRef>
+            <a:effectRef idx="0">
+              <a:schemeClr val="accent1"/>
+            </a:effectRef>
+            <a:fontRef idx="minor">
+              <a:schemeClr val="lt1"/>
+            </a:fontRef>
+          </p:style>
+          <p:txBody>
+            <a:bodyPr rtlCol="0" anchor="ctr"/>
+            <a:lstStyle/>
+            <a:p>
+              <a:pPr algn="ctr"/>
+              <a:endParaRPr lang="pt-BR"/>
+            </a:p>
+          </p:txBody>
+        </p:sp>
+        <p:grpSp>
+          <p:nvGrpSpPr>
+            <p:cNvPr id="28" name="Grupo 27"/>
+            <p:cNvGrpSpPr/>
+            <p:nvPr/>
+          </p:nvGrpSpPr>
+          <p:grpSpPr>
+            <a:xfrm>
+              <a:off x="570449" y="2472515"/>
+              <a:ext cx="3375917" cy="2561041"/>
+              <a:chOff x="827584" y="2204860"/>
+              <a:chExt cx="5143146" cy="3168346"/>
+            </a:xfrm>
+          </p:grpSpPr>
+          <p:sp>
+            <p:nvSpPr>
+              <p:cNvPr id="27" name="Retângulo de cantos arredondados 26"/>
+              <p:cNvSpPr/>
+              <p:nvPr/>
+            </p:nvSpPr>
+            <p:spPr>
+              <a:xfrm>
+                <a:off x="1167637" y="2204860"/>
+                <a:ext cx="4466481" cy="1544420"/>
+              </a:xfrm>
+              <a:prstGeom prst="roundRect">
+                <a:avLst/>
+              </a:prstGeom>
+              <a:solidFill>
+                <a:srgbClr val="6D4C41"/>
+              </a:solidFill>
+              <a:ln>
+                <a:noFill/>
+              </a:ln>
+            </p:spPr>
+            <p:style>
+              <a:lnRef idx="2">
+                <a:schemeClr val="accent1">
+                  <a:shade val="50000"/>
+                </a:schemeClr>
+              </a:lnRef>
+              <a:fillRef idx="1">
+                <a:schemeClr val="accent1"/>
+              </a:fillRef>
+              <a:effectRef idx="0">
+                <a:schemeClr val="accent1"/>
+              </a:effectRef>
+              <a:fontRef idx="minor">
+                <a:schemeClr val="lt1"/>
+              </a:fontRef>
+            </p:style>
+            <p:txBody>
+              <a:bodyPr rtlCol="0" anchor="ctr"/>
+              <a:lstStyle/>
+              <a:p>
+                <a:pPr algn="ctr"/>
+                <a:endParaRPr lang="pt-BR"/>
+              </a:p>
+            </p:txBody>
+          </p:sp>
+          <p:sp>
+            <p:nvSpPr>
+              <p:cNvPr id="26" name="Retângulo de cantos arredondados 25"/>
+              <p:cNvSpPr/>
+              <p:nvPr/>
+            </p:nvSpPr>
+            <p:spPr>
+              <a:xfrm>
+                <a:off x="1167639" y="2348876"/>
+                <a:ext cx="4466480" cy="1400404"/>
+              </a:xfrm>
+              <a:prstGeom prst="roundRect">
+                <a:avLst/>
+              </a:prstGeom>
+              <a:solidFill>
+                <a:srgbClr val="513931"/>
+              </a:solidFill>
+              <a:ln>
+                <a:noFill/>
+              </a:ln>
+            </p:spPr>
+            <p:style>
+              <a:lnRef idx="2">
+                <a:schemeClr val="accent1">
+                  <a:shade val="50000"/>
+                </a:schemeClr>
+              </a:lnRef>
+              <a:fillRef idx="1">
+                <a:schemeClr val="accent1"/>
+              </a:fillRef>
+              <a:effectRef idx="0">
+                <a:schemeClr val="accent1"/>
+              </a:effectRef>
+              <a:fontRef idx="minor">
+                <a:schemeClr val="lt1"/>
+              </a:fontRef>
+            </p:style>
+            <p:txBody>
+              <a:bodyPr rtlCol="0" anchor="ctr"/>
+              <a:lstStyle/>
+              <a:p>
+                <a:pPr algn="ctr"/>
+                <a:endParaRPr lang="pt-BR"/>
+              </a:p>
+            </p:txBody>
+          </p:sp>
+          <p:sp>
+            <p:nvSpPr>
+              <p:cNvPr id="25" name="Retângulo de cantos arredondados 24"/>
+              <p:cNvSpPr/>
+              <p:nvPr/>
+            </p:nvSpPr>
+            <p:spPr>
+              <a:xfrm>
+                <a:off x="3417894" y="2975569"/>
+                <a:ext cx="1946194" cy="1008110"/>
+              </a:xfrm>
+              <a:prstGeom prst="roundRect">
+                <a:avLst>
+                  <a:gd name="adj" fmla="val 50000"/>
+                </a:avLst>
+              </a:prstGeom>
+              <a:solidFill>
+                <a:schemeClr val="bg1"/>
+              </a:solidFill>
+              <a:ln>
+                <a:noFill/>
+              </a:ln>
+            </p:spPr>
+            <p:style>
+              <a:lnRef idx="2">
+                <a:schemeClr val="accent1">
+                  <a:shade val="50000"/>
+                </a:schemeClr>
+              </a:lnRef>
+              <a:fillRef idx="1">
+                <a:schemeClr val="accent1"/>
+              </a:fillRef>
+              <a:effectRef idx="0">
+                <a:schemeClr val="accent1"/>
+              </a:effectRef>
+              <a:fontRef idx="minor">
+                <a:schemeClr val="lt1"/>
+              </a:fontRef>
+            </p:style>
+            <p:txBody>
+              <a:bodyPr rtlCol="0" anchor="ctr"/>
+              <a:lstStyle/>
+              <a:p>
+                <a:pPr algn="ctr"/>
+                <a:endParaRPr lang="pt-BR"/>
+              </a:p>
+            </p:txBody>
+          </p:sp>
+          <p:sp>
+            <p:nvSpPr>
+              <p:cNvPr id="23" name="Retângulo de cantos arredondados 22"/>
+              <p:cNvSpPr/>
+              <p:nvPr/>
+            </p:nvSpPr>
+            <p:spPr>
+              <a:xfrm>
+                <a:off x="1437668" y="2967061"/>
+                <a:ext cx="1946194" cy="1008110"/>
+              </a:xfrm>
+              <a:prstGeom prst="roundRect">
+                <a:avLst>
+                  <a:gd name="adj" fmla="val 50000"/>
+                </a:avLst>
+              </a:prstGeom>
+              <a:solidFill>
+                <a:schemeClr val="bg1"/>
+              </a:solidFill>
+              <a:ln>
+                <a:noFill/>
+              </a:ln>
+            </p:spPr>
+            <p:style>
+              <a:lnRef idx="2">
+                <a:schemeClr val="accent1">
+                  <a:shade val="50000"/>
+                </a:schemeClr>
+              </a:lnRef>
+              <a:fillRef idx="1">
+                <a:schemeClr val="accent1"/>
+              </a:fillRef>
+              <a:effectRef idx="0">
+                <a:schemeClr val="accent1"/>
+              </a:effectRef>
+              <a:fontRef idx="minor">
+                <a:schemeClr val="lt1"/>
+              </a:fontRef>
+            </p:style>
+            <p:txBody>
+              <a:bodyPr rtlCol="0" anchor="ctr"/>
+              <a:lstStyle/>
+              <a:p>
+                <a:pPr algn="ctr"/>
+                <a:endParaRPr lang="pt-BR"/>
+              </a:p>
+            </p:txBody>
+          </p:sp>
+          <p:grpSp>
+            <p:nvGrpSpPr>
+              <p:cNvPr id="22" name="Grupo 21"/>
+              <p:cNvGrpSpPr/>
+              <p:nvPr/>
+            </p:nvGrpSpPr>
+            <p:grpSpPr>
+              <a:xfrm>
+                <a:off x="1077628" y="3562849"/>
+                <a:ext cx="4628497" cy="1018271"/>
+                <a:chOff x="1077628" y="3356992"/>
+                <a:chExt cx="4628498" cy="1018273"/>
+              </a:xfrm>
+            </p:grpSpPr>
+            <p:sp>
+              <p:nvSpPr>
+                <p:cNvPr id="21" name="Retângulo de cantos arredondados 20"/>
+                <p:cNvSpPr/>
+                <p:nvPr/>
+              </p:nvSpPr>
+              <p:spPr>
+                <a:xfrm>
+                  <a:off x="1077628" y="3356992"/>
+                  <a:ext cx="4628498" cy="1018273"/>
+                </a:xfrm>
+                <a:prstGeom prst="roundRect">
+                  <a:avLst/>
+                </a:prstGeom>
+                <a:solidFill>
+                  <a:srgbClr val="C96009"/>
+                </a:solidFill>
+                <a:ln>
+                  <a:noFill/>
+                </a:ln>
+              </p:spPr>
+              <p:style>
+                <a:lnRef idx="2">
+                  <a:schemeClr val="accent1">
+                    <a:shade val="50000"/>
+                  </a:schemeClr>
+                </a:lnRef>
+                <a:fillRef idx="1">
+                  <a:schemeClr val="accent1"/>
+                </a:fillRef>
+                <a:effectRef idx="0">
+                  <a:schemeClr val="accent1"/>
+                </a:effectRef>
+                <a:fontRef idx="minor">
+                  <a:schemeClr val="lt1"/>
+                </a:fontRef>
+              </p:style>
+              <p:txBody>
+                <a:bodyPr rtlCol="0" anchor="ctr"/>
+                <a:lstStyle/>
+                <a:p>
+                  <a:pPr algn="ctr"/>
+                  <a:endParaRPr lang="pt-BR"/>
+                </a:p>
+              </p:txBody>
+            </p:sp>
+            <p:sp>
+              <p:nvSpPr>
+                <p:cNvPr id="20" name="Retângulo de cantos arredondados 19"/>
+                <p:cNvSpPr/>
+                <p:nvPr/>
+              </p:nvSpPr>
+              <p:spPr>
+                <a:xfrm>
+                  <a:off x="1167638" y="3511169"/>
+                  <a:ext cx="4466480" cy="864096"/>
+                </a:xfrm>
+                <a:prstGeom prst="roundRect">
+                  <a:avLst/>
+                </a:prstGeom>
+                <a:solidFill>
+                  <a:schemeClr val="accent6">
+                    <a:lumMod val="75000"/>
+                  </a:schemeClr>
+                </a:solidFill>
+                <a:ln>
+                  <a:noFill/>
+                </a:ln>
+              </p:spPr>
+              <p:style>
+                <a:lnRef idx="2">
+                  <a:schemeClr val="accent1">
+                    <a:shade val="50000"/>
+                  </a:schemeClr>
+                </a:lnRef>
+                <a:fillRef idx="1">
+                  <a:schemeClr val="accent1"/>
+                </a:fillRef>
+                <a:effectRef idx="0">
+                  <a:schemeClr val="accent1"/>
+                </a:effectRef>
+                <a:fontRef idx="minor">
+                  <a:schemeClr val="lt1"/>
+                </a:fontRef>
+              </p:style>
+              <p:txBody>
+                <a:bodyPr rtlCol="0" anchor="ctr"/>
+                <a:lstStyle/>
+                <a:p>
+                  <a:pPr algn="ctr"/>
+                  <a:endParaRPr lang="pt-BR"/>
+                </a:p>
+              </p:txBody>
+            </p:sp>
+          </p:grpSp>
+          <p:sp>
+            <p:nvSpPr>
+              <p:cNvPr id="7" name="Retângulo 6"/>
+              <p:cNvSpPr/>
+              <p:nvPr/>
+            </p:nvSpPr>
+            <p:spPr>
+              <a:xfrm>
+                <a:off x="1077628" y="4941159"/>
+                <a:ext cx="360040" cy="432047"/>
+              </a:xfrm>
+              <a:prstGeom prst="rect">
+                <a:avLst/>
+              </a:prstGeom>
+              <a:solidFill>
+                <a:srgbClr val="6D4C41"/>
+              </a:solidFill>
+              <a:ln>
+                <a:noFill/>
+              </a:ln>
+            </p:spPr>
+            <p:style>
+              <a:lnRef idx="2">
+                <a:schemeClr val="accent1">
+                  <a:shade val="50000"/>
+                </a:schemeClr>
+              </a:lnRef>
+              <a:fillRef idx="1">
+                <a:schemeClr val="accent1"/>
+              </a:fillRef>
+              <a:effectRef idx="0">
+                <a:schemeClr val="accent1"/>
+              </a:effectRef>
+              <a:fontRef idx="minor">
+                <a:schemeClr val="lt1"/>
+              </a:fontRef>
+            </p:style>
+            <p:txBody>
+              <a:bodyPr rtlCol="0" anchor="ctr"/>
+              <a:lstStyle/>
+              <a:p>
+                <a:pPr algn="ctr"/>
+                <a:endParaRPr lang="pt-BR"/>
+              </a:p>
+            </p:txBody>
+          </p:sp>
+          <p:sp>
+            <p:nvSpPr>
+              <p:cNvPr id="12" name="Retângulo 11"/>
+              <p:cNvSpPr/>
+              <p:nvPr/>
+            </p:nvSpPr>
+            <p:spPr>
+              <a:xfrm>
+                <a:off x="5364087" y="4941159"/>
+                <a:ext cx="360040" cy="432047"/>
+              </a:xfrm>
+              <a:prstGeom prst="rect">
+                <a:avLst/>
+              </a:prstGeom>
+              <a:solidFill>
+                <a:srgbClr val="6D4C41"/>
+              </a:solidFill>
+              <a:ln>
+                <a:noFill/>
+              </a:ln>
+            </p:spPr>
+            <p:style>
+              <a:lnRef idx="2">
+                <a:schemeClr val="accent1">
+                  <a:shade val="50000"/>
+                </a:schemeClr>
+              </a:lnRef>
+              <a:fillRef idx="1">
+                <a:schemeClr val="accent1"/>
+              </a:fillRef>
+              <a:effectRef idx="0">
+                <a:schemeClr val="accent1"/>
+              </a:effectRef>
+              <a:fontRef idx="minor">
+                <a:schemeClr val="lt1"/>
+              </a:fontRef>
+            </p:style>
+            <p:txBody>
+              <a:bodyPr rtlCol="0" anchor="ctr"/>
+              <a:lstStyle/>
+              <a:p>
+                <a:pPr algn="ctr"/>
+                <a:endParaRPr lang="pt-BR"/>
+              </a:p>
+            </p:txBody>
+          </p:sp>
+          <p:sp>
+            <p:nvSpPr>
+              <p:cNvPr id="8" name="Retângulo de cantos arredondados 7"/>
+              <p:cNvSpPr/>
+              <p:nvPr/>
+            </p:nvSpPr>
+            <p:spPr>
+              <a:xfrm>
+                <a:off x="827584" y="4147238"/>
+                <a:ext cx="5139704" cy="914398"/>
+              </a:xfrm>
+              <a:prstGeom prst="roundRect">
+                <a:avLst/>
+              </a:prstGeom>
+              <a:solidFill>
+                <a:srgbClr val="6D4C41"/>
+              </a:solidFill>
+              <a:ln>
+                <a:noFill/>
+              </a:ln>
+            </p:spPr>
+            <p:style>
+              <a:lnRef idx="2">
+                <a:schemeClr val="accent1">
+                  <a:shade val="50000"/>
+                </a:schemeClr>
+              </a:lnRef>
+              <a:fillRef idx="1">
+                <a:schemeClr val="accent1"/>
+              </a:fillRef>
+              <a:effectRef idx="0">
+                <a:schemeClr val="accent1"/>
+              </a:effectRef>
+              <a:fontRef idx="minor">
+                <a:schemeClr val="lt1"/>
+              </a:fontRef>
+            </p:style>
+            <p:txBody>
+              <a:bodyPr rtlCol="0" anchor="ctr"/>
+              <a:lstStyle/>
+              <a:p>
+                <a:pPr algn="ctr"/>
+                <a:endParaRPr lang="pt-BR"/>
+              </a:p>
+            </p:txBody>
+          </p:sp>
+          <p:sp>
+            <p:nvSpPr>
+              <p:cNvPr id="14" name="Retângulo 13"/>
+              <p:cNvSpPr/>
+              <p:nvPr/>
+            </p:nvSpPr>
+            <p:spPr>
+              <a:xfrm>
+                <a:off x="1077629" y="5061636"/>
+                <a:ext cx="360040" cy="95547"/>
+              </a:xfrm>
+              <a:prstGeom prst="rect">
+                <a:avLst/>
+              </a:prstGeom>
+              <a:solidFill>
+                <a:srgbClr val="513931"/>
+              </a:solidFill>
+              <a:ln>
+                <a:noFill/>
+              </a:ln>
+            </p:spPr>
+            <p:style>
+              <a:lnRef idx="2">
+                <a:schemeClr val="accent1">
+                  <a:shade val="50000"/>
+                </a:schemeClr>
+              </a:lnRef>
+              <a:fillRef idx="1">
+                <a:schemeClr val="accent1"/>
+              </a:fillRef>
+              <a:effectRef idx="0">
+                <a:schemeClr val="accent1"/>
+              </a:effectRef>
+              <a:fontRef idx="minor">
+                <a:schemeClr val="lt1"/>
+              </a:fontRef>
+            </p:style>
+            <p:txBody>
+              <a:bodyPr rtlCol="0" anchor="ctr"/>
+              <a:lstStyle/>
+              <a:p>
+                <a:pPr algn="ctr"/>
+                <a:endParaRPr lang="pt-BR"/>
+              </a:p>
+            </p:txBody>
+          </p:sp>
+          <p:sp>
+            <p:nvSpPr>
+              <p:cNvPr id="15" name="Retângulo 14"/>
+              <p:cNvSpPr/>
+              <p:nvPr/>
+            </p:nvSpPr>
+            <p:spPr>
+              <a:xfrm>
+                <a:off x="5362463" y="5061636"/>
+                <a:ext cx="360040" cy="95547"/>
+              </a:xfrm>
+              <a:prstGeom prst="rect">
+                <a:avLst/>
+              </a:prstGeom>
+              <a:solidFill>
+                <a:srgbClr val="513931"/>
+              </a:solidFill>
+              <a:ln>
+                <a:noFill/>
+              </a:ln>
+            </p:spPr>
+            <p:style>
+              <a:lnRef idx="2">
+                <a:schemeClr val="accent1">
+                  <a:shade val="50000"/>
+                </a:schemeClr>
+              </a:lnRef>
+              <a:fillRef idx="1">
+                <a:schemeClr val="accent1"/>
+              </a:fillRef>
+              <a:effectRef idx="0">
+                <a:schemeClr val="accent1"/>
+              </a:effectRef>
+              <a:fontRef idx="minor">
+                <a:schemeClr val="lt1"/>
+              </a:fontRef>
+            </p:style>
+            <p:txBody>
+              <a:bodyPr rtlCol="0" anchor="ctr"/>
+              <a:lstStyle/>
+              <a:p>
+                <a:pPr algn="ctr"/>
+                <a:endParaRPr lang="pt-BR"/>
+              </a:p>
+            </p:txBody>
+          </p:sp>
+          <p:sp>
+            <p:nvSpPr>
+              <p:cNvPr id="16" name="Retângulo 15"/>
+              <p:cNvSpPr/>
+              <p:nvPr/>
+            </p:nvSpPr>
+            <p:spPr>
+              <a:xfrm>
+                <a:off x="1077629" y="4941160"/>
+                <a:ext cx="4646500" cy="120476"/>
+              </a:xfrm>
+              <a:prstGeom prst="rect">
+                <a:avLst/>
+              </a:prstGeom>
+              <a:solidFill>
+                <a:srgbClr val="513931"/>
+              </a:solidFill>
+              <a:ln>
+                <a:noFill/>
+              </a:ln>
+            </p:spPr>
+            <p:style>
+              <a:lnRef idx="2">
+                <a:schemeClr val="accent1">
+                  <a:shade val="50000"/>
+                </a:schemeClr>
+              </a:lnRef>
+              <a:fillRef idx="1">
+                <a:schemeClr val="accent1"/>
+              </a:fillRef>
+              <a:effectRef idx="0">
+                <a:schemeClr val="accent1"/>
+              </a:effectRef>
+              <a:fontRef idx="minor">
+                <a:schemeClr val="lt1"/>
+              </a:fontRef>
+            </p:style>
+            <p:txBody>
+              <a:bodyPr rtlCol="0" anchor="ctr"/>
+              <a:lstStyle/>
+              <a:p>
+                <a:pPr algn="ctr"/>
+                <a:endParaRPr lang="pt-BR"/>
+              </a:p>
+            </p:txBody>
+          </p:sp>
+          <p:sp>
+            <p:nvSpPr>
+              <p:cNvPr id="19" name="Retângulo de cantos arredondados 18"/>
+              <p:cNvSpPr/>
+              <p:nvPr/>
+            </p:nvSpPr>
+            <p:spPr>
+              <a:xfrm>
+                <a:off x="831026" y="4893393"/>
+                <a:ext cx="5139704" cy="168250"/>
+              </a:xfrm>
+              <a:prstGeom prst="roundRect">
+                <a:avLst/>
+              </a:prstGeom>
+              <a:solidFill>
+                <a:srgbClr val="513931"/>
+              </a:solidFill>
+              <a:ln>
+                <a:noFill/>
+              </a:ln>
+            </p:spPr>
+            <p:style>
+              <a:lnRef idx="2">
+                <a:schemeClr val="accent1">
+                  <a:shade val="50000"/>
+                </a:schemeClr>
+              </a:lnRef>
+              <a:fillRef idx="1">
+                <a:schemeClr val="accent1"/>
+              </a:fillRef>
+              <a:effectRef idx="0">
+                <a:schemeClr val="accent1"/>
+              </a:effectRef>
+              <a:fontRef idx="minor">
+                <a:schemeClr val="lt1"/>
+              </a:fontRef>
+            </p:style>
+            <p:txBody>
+              <a:bodyPr rtlCol="0" anchor="ctr"/>
+              <a:lstStyle/>
+              <a:p>
+                <a:pPr algn="ctr"/>
+                <a:endParaRPr lang="pt-BR"/>
+              </a:p>
+            </p:txBody>
+          </p:sp>
+        </p:grpSp>
+      </p:grpSp>
+      <p:sp>
+        <p:nvSpPr>
+          <p:cNvPr id="1024" name="Elipse 1023"/>
+          <p:cNvSpPr/>
+          <p:nvPr/>
+        </p:nvSpPr>
+        <p:spPr>
+          <a:xfrm>
+            <a:off x="2807804" y="2279663"/>
+            <a:ext cx="1224136" cy="1224136"/>
+          </a:xfrm>
+          <a:prstGeom prst="ellipse">
+            <a:avLst/>
+          </a:prstGeom>
+          <a:solidFill>
+            <a:schemeClr val="bg1"/>
+          </a:solidFill>
+          <a:ln>
+            <a:noFill/>
+          </a:ln>
+        </p:spPr>
+        <p:style>
+          <a:lnRef idx="2">
+            <a:schemeClr val="accent1">
+              <a:shade val="50000"/>
+            </a:schemeClr>
+          </a:lnRef>
+          <a:fillRef idx="1">
+            <a:schemeClr val="accent1"/>
+          </a:fillRef>
+          <a:effectRef idx="0">
+            <a:schemeClr val="accent1"/>
+          </a:effectRef>
+          <a:fontRef idx="minor">
+            <a:schemeClr val="lt1"/>
+          </a:fontRef>
+        </p:style>
+        <p:txBody>
+          <a:bodyPr rtlCol="0" anchor="ctr"/>
+          <a:lstStyle/>
+          <a:p>
+            <a:pPr algn="ctr"/>
+            <a:endParaRPr lang="pt-BR"/>
+          </a:p>
+        </p:txBody>
+      </p:sp>
+      <p:sp>
+        <p:nvSpPr>
+          <p:cNvPr id="1025" name="Retângulo de cantos arredondados 1024"/>
+          <p:cNvSpPr/>
+          <p:nvPr/>
+        </p:nvSpPr>
+        <p:spPr>
+          <a:xfrm>
+            <a:off x="2195736" y="3591721"/>
+            <a:ext cx="2448272" cy="1029767"/>
+          </a:xfrm>
+          <a:prstGeom prst="roundRect">
+            <a:avLst>
+              <a:gd name="adj" fmla="val 50000"/>
+            </a:avLst>
+          </a:prstGeom>
+          <a:solidFill>
+            <a:schemeClr val="bg1"/>
+          </a:solidFill>
+          <a:ln>
+            <a:noFill/>
+          </a:ln>
+        </p:spPr>
+        <p:style>
+          <a:lnRef idx="2">
+            <a:schemeClr val="accent1">
+              <a:shade val="50000"/>
+            </a:schemeClr>
+          </a:lnRef>
+          <a:fillRef idx="1">
+            <a:schemeClr val="accent1"/>
+          </a:fillRef>
+          <a:effectRef idx="0">
+            <a:schemeClr val="accent1"/>
+          </a:effectRef>
+          <a:fontRef idx="minor">
+            <a:schemeClr val="lt1"/>
+          </a:fontRef>
+        </p:style>
+        <p:txBody>
+          <a:bodyPr rtlCol="0" anchor="ctr"/>
+          <a:lstStyle/>
+          <a:p>
+            <a:pPr algn="ctr"/>
+            <a:endParaRPr lang="pt-BR"/>
+          </a:p>
+        </p:txBody>
+      </p:sp>
+      <p:sp>
+        <p:nvSpPr>
+          <p:cNvPr id="36" name="Retângulo de cantos arredondados 35"/>
+          <p:cNvSpPr/>
+          <p:nvPr/>
+        </p:nvSpPr>
+        <p:spPr>
+          <a:xfrm rot="3600000">
+            <a:off x="3510247" y="4446378"/>
+            <a:ext cx="2448272" cy="709813"/>
+          </a:xfrm>
+          <a:prstGeom prst="roundRect">
+            <a:avLst>
+              <a:gd name="adj" fmla="val 50000"/>
+            </a:avLst>
+          </a:prstGeom>
+          <a:solidFill>
+            <a:schemeClr val="bg1"/>
+          </a:solidFill>
+          <a:ln>
+            <a:noFill/>
+          </a:ln>
+        </p:spPr>
+        <p:style>
+          <a:lnRef idx="2">
+            <a:schemeClr val="accent1">
+              <a:shade val="50000"/>
+            </a:schemeClr>
+          </a:lnRef>
+          <a:fillRef idx="1">
+            <a:schemeClr val="accent1"/>
+          </a:fillRef>
+          <a:effectRef idx="0">
+            <a:schemeClr val="accent1"/>
+          </a:effectRef>
+          <a:fontRef idx="minor">
+            <a:schemeClr val="lt1"/>
+          </a:fontRef>
+        </p:style>
+        <p:txBody>
+          <a:bodyPr rtlCol="0" anchor="ctr"/>
+          <a:lstStyle/>
+          <a:p>
+            <a:pPr algn="ctr"/>
+            <a:endParaRPr lang="pt-BR"/>
+          </a:p>
+        </p:txBody>
+      </p:sp>
+      <p:sp>
+        <p:nvSpPr>
+          <p:cNvPr id="38" name="Retângulo de cantos arredondados 37"/>
+          <p:cNvSpPr/>
+          <p:nvPr/>
+        </p:nvSpPr>
+        <p:spPr>
+          <a:xfrm rot="18000000" flipH="1">
+            <a:off x="882915" y="4446378"/>
+            <a:ext cx="2448272" cy="709813"/>
+          </a:xfrm>
+          <a:prstGeom prst="roundRect">
+            <a:avLst>
+              <a:gd name="adj" fmla="val 50000"/>
+            </a:avLst>
+          </a:prstGeom>
+          <a:solidFill>
+            <a:schemeClr val="bg1"/>
+          </a:solidFill>
+          <a:ln>
+            <a:noFill/>
+          </a:ln>
+        </p:spPr>
+        <p:style>
+          <a:lnRef idx="2">
+            <a:schemeClr val="accent1">
+              <a:shade val="50000"/>
+            </a:schemeClr>
+          </a:lnRef>
+          <a:fillRef idx="1">
+            <a:schemeClr val="accent1"/>
+          </a:fillRef>
+          <a:effectRef idx="0">
+            <a:schemeClr val="accent1"/>
+          </a:effectRef>
+          <a:fontRef idx="minor">
+            <a:schemeClr val="lt1"/>
+          </a:fontRef>
+        </p:style>
+        <p:txBody>
+          <a:bodyPr rtlCol="0" anchor="ctr"/>
+          <a:lstStyle/>
+          <a:p>
+            <a:pPr algn="ctr"/>
+            <a:endParaRPr lang="pt-BR"/>
+          </a:p>
+        </p:txBody>
+      </p:sp>
+      <p:sp>
+        <p:nvSpPr>
+          <p:cNvPr id="1027" name="Elipse 1026"/>
+          <p:cNvSpPr/>
+          <p:nvPr/>
+        </p:nvSpPr>
+        <p:spPr>
+          <a:xfrm>
+            <a:off x="2735796" y="4194169"/>
+            <a:ext cx="1368152" cy="1214229"/>
+          </a:xfrm>
+          <a:prstGeom prst="ellipse">
+            <a:avLst/>
+          </a:prstGeom>
+          <a:solidFill>
+            <a:schemeClr val="bg1"/>
+          </a:solidFill>
+          <a:ln>
+            <a:noFill/>
+          </a:ln>
+        </p:spPr>
+        <p:style>
+          <a:lnRef idx="2">
+            <a:schemeClr val="accent1">
+              <a:shade val="50000"/>
+            </a:schemeClr>
+          </a:lnRef>
+          <a:fillRef idx="1">
+            <a:schemeClr val="accent1"/>
+          </a:fillRef>
+          <a:effectRef idx="0">
+            <a:schemeClr val="accent1"/>
+          </a:effectRef>
+          <a:fontRef idx="minor">
+            <a:schemeClr val="lt1"/>
+          </a:fontRef>
+        </p:style>
+        <p:txBody>
+          <a:bodyPr rtlCol="0" anchor="ctr"/>
+          <a:lstStyle/>
+          <a:p>
+            <a:pPr algn="ctr"/>
+            <a:endParaRPr lang="pt-BR"/>
+          </a:p>
+        </p:txBody>
+      </p:sp>
+      <p:sp>
+        <p:nvSpPr>
+          <p:cNvPr id="1030" name="Elipse 1029"/>
+          <p:cNvSpPr/>
+          <p:nvPr/>
+        </p:nvSpPr>
+        <p:spPr>
+          <a:xfrm>
+            <a:off x="5669755" y="3740491"/>
+            <a:ext cx="2121586" cy="2121586"/>
+          </a:xfrm>
+          <a:prstGeom prst="ellipse">
+            <a:avLst/>
+          </a:prstGeom>
+        </p:spPr>
+        <p:style>
+          <a:lnRef idx="2">
+            <a:schemeClr val="accent1">
+              <a:shade val="50000"/>
+            </a:schemeClr>
+          </a:lnRef>
+          <a:fillRef idx="1">
+            <a:schemeClr val="accent1"/>
+          </a:fillRef>
+          <a:effectRef idx="0">
+            <a:schemeClr val="accent1"/>
+          </a:effectRef>
+          <a:fontRef idx="minor">
+            <a:schemeClr val="lt1"/>
+          </a:fontRef>
+        </p:style>
+        <p:txBody>
+          <a:bodyPr rtlCol="0" anchor="ctr"/>
+          <a:lstStyle/>
+          <a:p>
+            <a:pPr algn="ctr"/>
+            <a:endParaRPr lang="pt-BR"/>
+          </a:p>
+        </p:txBody>
+      </p:sp>
+      <p:cxnSp>
+        <p:nvCxnSpPr>
+          <p:cNvPr id="1032" name="Conector reto 1031"/>
+          <p:cNvCxnSpPr>
+            <a:stCxn id="1030" idx="2"/>
+            <a:endCxn id="1030" idx="6"/>
+          </p:cNvCxnSpPr>
+          <p:nvPr/>
+        </p:nvCxnSpPr>
+        <p:spPr>
+          <a:xfrm>
+            <a:off x="5669755" y="4801284"/>
+            <a:ext cx="2121586" cy="0"/>
+          </a:xfrm>
+          <a:prstGeom prst="line">
+            <a:avLst/>
+          </a:prstGeom>
+        </p:spPr>
+        <p:style>
+          <a:lnRef idx="1">
+            <a:schemeClr val="accent1"/>
+          </a:lnRef>
+          <a:fillRef idx="0">
+            <a:schemeClr val="accent1"/>
+          </a:fillRef>
+          <a:effectRef idx="0">
+            <a:schemeClr val="accent1"/>
+          </a:effectRef>
+          <a:fontRef idx="minor">
+            <a:schemeClr val="tx1"/>
+          </a:fontRef>
+        </p:style>
+      </p:cxnSp>
+      <p:sp>
+        <p:nvSpPr>
+          <p:cNvPr id="1034" name="Retângulo 1033"/>
+          <p:cNvSpPr/>
+          <p:nvPr/>
+        </p:nvSpPr>
+        <p:spPr>
+          <a:xfrm>
+            <a:off x="5508104" y="4801284"/>
+            <a:ext cx="2664296" cy="1364020"/>
+          </a:xfrm>
+          <a:prstGeom prst="rect">
+            <a:avLst/>
+          </a:prstGeom>
+          <a:solidFill>
+            <a:schemeClr val="bg1"/>
+          </a:solidFill>
+          <a:ln>
+            <a:noFill/>
+          </a:ln>
+        </p:spPr>
+        <p:style>
+          <a:lnRef idx="2">
+            <a:schemeClr val="accent1">
+              <a:shade val="50000"/>
+            </a:schemeClr>
+          </a:lnRef>
+          <a:fillRef idx="1">
+            <a:schemeClr val="accent1"/>
+          </a:fillRef>
+          <a:effectRef idx="0">
+            <a:schemeClr val="accent1"/>
+          </a:effectRef>
+          <a:fontRef idx="minor">
+            <a:schemeClr val="lt1"/>
+          </a:fontRef>
+        </p:style>
+        <p:txBody>
+          <a:bodyPr rtlCol="0" anchor="ctr"/>
+          <a:lstStyle/>
+          <a:p>
+            <a:pPr algn="ctr"/>
+            <a:endParaRPr lang="pt-BR"/>
+          </a:p>
+        </p:txBody>
+      </p:sp>
+    </p:spTree>
+    <p:extLst>
+      <p:ext uri="{BB962C8B-B14F-4D97-AF65-F5344CB8AC3E}">
+        <p14:creationId xmlns:p14="http://schemas.microsoft.com/office/powerpoint/2010/main" val="3937181533"/>
+      </p:ext>
+    </p:extLst>
+  </p:cSld>
+  <p:clrMapOvr>
+    <a:masterClrMapping/>
+  </p:clrMapOvr>
+</p:sld>
+</file>
+
+<file path=ppt/slides/slide2.xml><?xml version="1.0" encoding="utf-8"?>
+<p:sld xmlns:a="http://schemas.openxmlformats.org/drawingml/2006/main" xmlns:r="http://schemas.openxmlformats.org/officeDocument/2006/relationships" xmlns:p="http://schemas.openxmlformats.org/presentationml/2006/main">
+  <p:cSld>
+    <p:bg>
+      <p:bgPr>
+        <a:solidFill>
+          <a:schemeClr val="accent6"/>
+        </a:solidFill>
+        <a:effectLst/>
+      </p:bgPr>
+    </p:bg>
+    <p:spTree>
+      <p:nvGrpSpPr>
+        <p:cNvPr id="1" name=""/>
+        <p:cNvGrpSpPr/>
+        <p:nvPr/>
+      </p:nvGrpSpPr>
+      <p:grpSpPr>
+        <a:xfrm>
+          <a:off x="0" y="0"/>
+          <a:ext cx="0" cy="0"/>
+          <a:chOff x="0" y="0"/>
+          <a:chExt cx="0" cy="0"/>
+        </a:xfrm>
+      </p:grpSpPr>
+      <p:sp>
+        <p:nvSpPr>
+          <p:cNvPr id="2" name="CaixaDeTexto 1"/>
+          <p:cNvSpPr txBox="1"/>
+          <p:nvPr/>
+        </p:nvSpPr>
+        <p:spPr>
+          <a:xfrm>
+            <a:off x="971600" y="620688"/>
+            <a:ext cx="436338" cy="646331"/>
+          </a:xfrm>
+          <a:prstGeom prst="rect">
+            <a:avLst/>
+          </a:prstGeom>
+          <a:noFill/>
+        </p:spPr>
+        <p:txBody>
+          <a:bodyPr wrap="none" rtlCol="0">
+            <a:spAutoFit/>
+          </a:bodyPr>
+          <a:lstStyle/>
+          <a:p>
+            <a:r>
+              <a:rPr lang="pt-BR" sz="3600" dirty="0" smtClean="0"/>
+              <a:t>B</a:t>
+            </a:r>
+            <a:endParaRPr lang="pt-BR" sz="3600" dirty="0"/>
+          </a:p>
+        </p:txBody>
+      </p:sp>
+      <p:grpSp>
+        <p:nvGrpSpPr>
+          <p:cNvPr id="1030" name="Grupo 1029"/>
+          <p:cNvGrpSpPr/>
+          <p:nvPr/>
+        </p:nvGrpSpPr>
+        <p:grpSpPr>
+          <a:xfrm>
+            <a:off x="3541651" y="2735095"/>
+            <a:ext cx="3584204" cy="2016224"/>
+            <a:chOff x="3541651" y="2735095"/>
+            <a:chExt cx="3584204" cy="2016224"/>
+          </a:xfrm>
+        </p:grpSpPr>
+        <p:grpSp>
+          <p:nvGrpSpPr>
+            <p:cNvPr id="8" name="Grupo 7"/>
+            <p:cNvGrpSpPr/>
+            <p:nvPr/>
+          </p:nvGrpSpPr>
+          <p:grpSpPr>
+            <a:xfrm rot="2693523">
+              <a:off x="3541651" y="2735095"/>
+              <a:ext cx="504056" cy="2016224"/>
+              <a:chOff x="5769128" y="2999779"/>
+              <a:chExt cx="504056" cy="2016224"/>
+            </a:xfrm>
+          </p:grpSpPr>
+          <p:sp>
+            <p:nvSpPr>
+              <p:cNvPr id="6" name="Retângulo de cantos arredondados 5"/>
+              <p:cNvSpPr/>
+              <p:nvPr/>
+            </p:nvSpPr>
+            <p:spPr>
+              <a:xfrm>
+                <a:off x="5769128" y="2999779"/>
+                <a:ext cx="504056" cy="2016224"/>
+              </a:xfrm>
+              <a:prstGeom prst="roundRect">
+                <a:avLst/>
+              </a:prstGeom>
+              <a:solidFill>
+                <a:schemeClr val="bg1">
+                  <a:lumMod val="65000"/>
+                </a:schemeClr>
+              </a:solidFill>
+              <a:ln>
+                <a:noFill/>
+              </a:ln>
+            </p:spPr>
+            <p:style>
+              <a:lnRef idx="2">
+                <a:schemeClr val="accent1">
+                  <a:shade val="50000"/>
+                </a:schemeClr>
+              </a:lnRef>
+              <a:fillRef idx="1">
+                <a:schemeClr val="accent1"/>
+              </a:fillRef>
+              <a:effectRef idx="0">
+                <a:schemeClr val="accent1"/>
+              </a:effectRef>
+              <a:fontRef idx="minor">
+                <a:schemeClr val="lt1"/>
+              </a:fontRef>
+            </p:style>
+            <p:txBody>
+              <a:bodyPr rtlCol="0" anchor="ctr"/>
+              <a:lstStyle/>
+              <a:p>
+                <a:pPr algn="ctr"/>
+                <a:endParaRPr lang="pt-BR"/>
+              </a:p>
+            </p:txBody>
+          </p:sp>
+          <p:sp>
+            <p:nvSpPr>
+              <p:cNvPr id="3" name="Retângulo de cantos arredondados 2"/>
+              <p:cNvSpPr/>
+              <p:nvPr/>
+            </p:nvSpPr>
+            <p:spPr>
+              <a:xfrm>
+                <a:off x="5841136" y="3731925"/>
+                <a:ext cx="360040" cy="1224136"/>
+              </a:xfrm>
+              <a:prstGeom prst="roundRect">
+                <a:avLst/>
+              </a:prstGeom>
+              <a:solidFill>
+                <a:srgbClr val="E23C2A"/>
+              </a:solidFill>
+              <a:ln>
+                <a:noFill/>
+              </a:ln>
+            </p:spPr>
+            <p:style>
+              <a:lnRef idx="2">
+                <a:schemeClr val="accent1">
+                  <a:shade val="50000"/>
+                </a:schemeClr>
+              </a:lnRef>
+              <a:fillRef idx="1">
+                <a:schemeClr val="accent1"/>
+              </a:fillRef>
+              <a:effectRef idx="0">
+                <a:schemeClr val="accent1"/>
+              </a:effectRef>
+              <a:fontRef idx="minor">
+                <a:schemeClr val="lt1"/>
+              </a:fontRef>
+            </p:style>
+            <p:txBody>
+              <a:bodyPr rtlCol="0" anchor="ctr"/>
+              <a:lstStyle/>
+              <a:p>
+                <a:pPr algn="ctr"/>
+                <a:endParaRPr lang="pt-BR"/>
+              </a:p>
+            </p:txBody>
+          </p:sp>
+          <p:sp>
+            <p:nvSpPr>
+              <p:cNvPr id="9" name="Retângulo de cantos arredondados 8"/>
+              <p:cNvSpPr/>
+              <p:nvPr/>
+            </p:nvSpPr>
+            <p:spPr>
+              <a:xfrm>
+                <a:off x="5841136" y="4059615"/>
+                <a:ext cx="360040" cy="896447"/>
+              </a:xfrm>
+              <a:custGeom>
+                <a:avLst/>
+                <a:gdLst/>
+                <a:ahLst/>
+                <a:cxnLst/>
+                <a:rect l="l" t="t" r="r" b="b"/>
+                <a:pathLst>
+                  <a:path w="360040" h="896447">
+                    <a:moveTo>
+                      <a:pt x="0" y="0"/>
+                    </a:moveTo>
+                    <a:lnTo>
+                      <a:pt x="360040" y="273996"/>
+                    </a:lnTo>
+                    <a:lnTo>
+                      <a:pt x="360040" y="836439"/>
+                    </a:lnTo>
+                    <a:cubicBezTo>
+                      <a:pt x="360040" y="869581"/>
+                      <a:pt x="333174" y="896447"/>
+                      <a:pt x="300032" y="896447"/>
+                    </a:cubicBezTo>
+                    <a:lnTo>
+                      <a:pt x="60008" y="896447"/>
+                    </a:lnTo>
+                    <a:cubicBezTo>
+                      <a:pt x="26866" y="896447"/>
+                      <a:pt x="0" y="869581"/>
+                      <a:pt x="0" y="836439"/>
+                    </a:cubicBezTo>
+                    <a:close/>
+                  </a:path>
+                </a:pathLst>
+              </a:custGeom>
+              <a:solidFill>
+                <a:srgbClr val="C00000"/>
+              </a:solidFill>
+              <a:ln>
+                <a:noFill/>
+              </a:ln>
+            </p:spPr>
+            <p:style>
+              <a:lnRef idx="2">
+                <a:schemeClr val="accent1">
+                  <a:shade val="50000"/>
+                </a:schemeClr>
+              </a:lnRef>
+              <a:fillRef idx="1">
+                <a:schemeClr val="accent1"/>
+              </a:fillRef>
+              <a:effectRef idx="0">
+                <a:schemeClr val="accent1"/>
+              </a:effectRef>
+              <a:fontRef idx="minor">
+                <a:schemeClr val="lt1"/>
+              </a:fontRef>
+            </p:style>
+            <p:txBody>
+              <a:bodyPr rtlCol="0" anchor="ctr"/>
+              <a:lstStyle/>
+              <a:p>
+                <a:pPr algn="ctr"/>
+                <a:endParaRPr lang="pt-BR"/>
+              </a:p>
+            </p:txBody>
+          </p:sp>
+        </p:grpSp>
+        <p:sp>
+          <p:nvSpPr>
+            <p:cNvPr id="1029" name="Elipse 1028"/>
+            <p:cNvSpPr/>
+            <p:nvPr/>
+          </p:nvSpPr>
+          <p:spPr>
+            <a:xfrm>
+              <a:off x="4031189" y="4418563"/>
+              <a:ext cx="428991" cy="142770"/>
+            </a:xfrm>
+            <a:prstGeom prst="ellipse">
+              <a:avLst/>
+            </a:prstGeom>
             <a:solidFill>
-              <a:schemeClr val="accent3">
-                <a:lumMod val="50000"/>
-              </a:schemeClr>
+              <a:srgbClr val="E23C2A"/>
             </a:solidFill>
             <a:ln>
               <a:noFill/>
@@ -4169,61 +4523,26 @@
             <a:lstStyle/>
             <a:p>
               <a:pPr algn="ctr"/>
-              <a:endParaRPr lang="pt-BR" u="sng"/>
+              <a:endParaRPr lang="pt-BR"/>
             </a:p>
           </p:txBody>
         </p:sp>
         <p:sp>
           <p:nvSpPr>
-            <p:cNvPr id="6" name="Elipse 5"/>
+            <p:cNvPr id="38" name="Elipse 37"/>
             <p:cNvSpPr/>
             <p:nvPr/>
           </p:nvSpPr>
           <p:spPr>
             <a:xfrm>
-              <a:off x="5110140" y="2780928"/>
-              <a:ext cx="1080120" cy="648072"/>
+              <a:off x="4311629" y="4469291"/>
+              <a:ext cx="428991" cy="142770"/>
             </a:xfrm>
-            <a:custGeom>
+            <a:prstGeom prst="ellipse">
               <a:avLst/>
-              <a:gdLst/>
-              <a:ahLst/>
-              <a:cxnLst/>
-              <a:rect l="l" t="t" r="r" b="b"/>
-              <a:pathLst>
-                <a:path w="1080120" h="648072">
-                  <a:moveTo>
-                    <a:pt x="540060" y="0"/>
-                  </a:moveTo>
-                  <a:cubicBezTo>
-                    <a:pt x="838327" y="0"/>
-                    <a:pt x="1080120" y="241793"/>
-                    <a:pt x="1080120" y="540060"/>
-                  </a:cubicBezTo>
-                  <a:lnTo>
-                    <a:pt x="1069232" y="648072"/>
-                  </a:lnTo>
-                  <a:lnTo>
-                    <a:pt x="10889" y="648072"/>
-                  </a:lnTo>
-                  <a:cubicBezTo>
-                    <a:pt x="3720" y="613184"/>
-                    <a:pt x="0" y="577056"/>
-                    <a:pt x="0" y="540060"/>
-                  </a:cubicBezTo>
-                  <a:cubicBezTo>
-                    <a:pt x="0" y="241793"/>
-                    <a:pt x="241793" y="0"/>
-                    <a:pt x="540060" y="0"/>
-                  </a:cubicBezTo>
-                  <a:close/>
-                </a:path>
-              </a:pathLst>
-            </a:custGeom>
+            </a:prstGeom>
             <a:solidFill>
-              <a:schemeClr val="accent3">
-                <a:lumMod val="50000"/>
-              </a:schemeClr>
+              <a:srgbClr val="E23C2A"/>
             </a:solidFill>
             <a:ln>
               <a:noFill/>
@@ -4250,53 +4569,26 @@
             <a:lstStyle/>
             <a:p>
               <a:pPr algn="ctr"/>
-              <a:endParaRPr lang="pt-BR" u="sng"/>
+              <a:endParaRPr lang="pt-BR"/>
             </a:p>
           </p:txBody>
         </p:sp>
         <p:sp>
           <p:nvSpPr>
-            <p:cNvPr id="7" name="Elipse 6"/>
+            <p:cNvPr id="39" name="Elipse 38"/>
             <p:cNvSpPr/>
             <p:nvPr/>
           </p:nvSpPr>
           <p:spPr>
             <a:xfrm>
-              <a:off x="5855693" y="2934092"/>
-              <a:ext cx="1071017" cy="494908"/>
+              <a:off x="4072209" y="4540676"/>
+              <a:ext cx="428991" cy="142770"/>
             </a:xfrm>
-            <a:custGeom>
+            <a:prstGeom prst="ellipse">
               <a:avLst/>
-              <a:gdLst/>
-              <a:ahLst/>
-              <a:cxnLst/>
-              <a:rect l="l" t="t" r="r" b="b"/>
-              <a:pathLst>
-                <a:path w="1071017" h="494908">
-                  <a:moveTo>
-                    <a:pt x="535508" y="0"/>
-                  </a:moveTo>
-                  <a:cubicBezTo>
-                    <a:pt x="818494" y="0"/>
-                    <a:pt x="1050644" y="217652"/>
-                    <a:pt x="1071017" y="494908"/>
-                  </a:cubicBezTo>
-                  <a:lnTo>
-                    <a:pt x="0" y="494908"/>
-                  </a:lnTo>
-                  <a:cubicBezTo>
-                    <a:pt x="20372" y="217652"/>
-                    <a:pt x="252523" y="0"/>
-                    <a:pt x="535508" y="0"/>
-                  </a:cubicBezTo>
-                  <a:close/>
-                </a:path>
-              </a:pathLst>
-            </a:custGeom>
+            </a:prstGeom>
             <a:solidFill>
-              <a:schemeClr val="accent3">
-                <a:lumMod val="50000"/>
-              </a:schemeClr>
+              <a:srgbClr val="E23C2A"/>
             </a:solidFill>
             <a:ln>
               <a:noFill/>
@@ -4323,161 +4615,1748 @@
             <a:lstStyle/>
             <a:p>
               <a:pPr algn="ctr"/>
-              <a:endParaRPr lang="pt-BR" u="sng"/>
+              <a:endParaRPr lang="pt-BR"/>
             </a:p>
           </p:txBody>
         </p:sp>
+        <p:grpSp>
+          <p:nvGrpSpPr>
+            <p:cNvPr id="1028" name="Grupo 1027"/>
+            <p:cNvGrpSpPr/>
+            <p:nvPr/>
+          </p:nvGrpSpPr>
+          <p:grpSpPr>
+            <a:xfrm rot="2940489">
+              <a:off x="4960605" y="1884567"/>
+              <a:ext cx="1137982" cy="3192518"/>
+              <a:chOff x="6497111" y="2061748"/>
+              <a:chExt cx="1235506" cy="3466114"/>
+            </a:xfrm>
+          </p:grpSpPr>
+          <p:sp>
+            <p:nvSpPr>
+              <p:cNvPr id="1024" name="Retângulo 1023"/>
+              <p:cNvSpPr/>
+              <p:nvPr/>
+            </p:nvSpPr>
+            <p:spPr>
+              <a:xfrm>
+                <a:off x="7088047" y="4786915"/>
+                <a:ext cx="45719" cy="442285"/>
+              </a:xfrm>
+              <a:prstGeom prst="rect">
+                <a:avLst/>
+              </a:prstGeom>
+              <a:solidFill>
+                <a:schemeClr val="bg1"/>
+              </a:solidFill>
+              <a:ln>
+                <a:noFill/>
+              </a:ln>
+            </p:spPr>
+            <p:style>
+              <a:lnRef idx="2">
+                <a:schemeClr val="accent1">
+                  <a:shade val="50000"/>
+                </a:schemeClr>
+              </a:lnRef>
+              <a:fillRef idx="1">
+                <a:schemeClr val="accent1"/>
+              </a:fillRef>
+              <a:effectRef idx="0">
+                <a:schemeClr val="accent1"/>
+              </a:effectRef>
+              <a:fontRef idx="minor">
+                <a:schemeClr val="lt1"/>
+              </a:fontRef>
+            </p:style>
+            <p:txBody>
+              <a:bodyPr rtlCol="0" anchor="ctr"/>
+              <a:lstStyle/>
+              <a:p>
+                <a:pPr algn="ctr"/>
+                <a:endParaRPr lang="pt-BR"/>
+              </a:p>
+            </p:txBody>
+          </p:sp>
+          <p:sp>
+            <p:nvSpPr>
+              <p:cNvPr id="31" name="Retângulo de cantos arredondados 30"/>
+              <p:cNvSpPr/>
+              <p:nvPr/>
+            </p:nvSpPr>
+            <p:spPr>
+              <a:xfrm>
+                <a:off x="7025568" y="4736073"/>
+                <a:ext cx="178675" cy="95631"/>
+              </a:xfrm>
+              <a:prstGeom prst="roundRect">
+                <a:avLst/>
+              </a:prstGeom>
+              <a:solidFill>
+                <a:srgbClr val="6D4C41"/>
+              </a:solidFill>
+              <a:ln>
+                <a:noFill/>
+              </a:ln>
+            </p:spPr>
+            <p:style>
+              <a:lnRef idx="2">
+                <a:schemeClr val="accent1">
+                  <a:shade val="50000"/>
+                </a:schemeClr>
+              </a:lnRef>
+              <a:fillRef idx="1">
+                <a:schemeClr val="accent1"/>
+              </a:fillRef>
+              <a:effectRef idx="0">
+                <a:schemeClr val="accent1"/>
+              </a:effectRef>
+              <a:fontRef idx="minor">
+                <a:schemeClr val="lt1"/>
+              </a:fontRef>
+            </p:style>
+            <p:txBody>
+              <a:bodyPr rtlCol="0" anchor="ctr"/>
+              <a:lstStyle/>
+              <a:p>
+                <a:pPr algn="ctr"/>
+                <a:endParaRPr lang="pt-BR"/>
+              </a:p>
+            </p:txBody>
+          </p:sp>
+          <p:sp>
+            <p:nvSpPr>
+              <p:cNvPr id="30" name="Retângulo de cantos arredondados 29"/>
+              <p:cNvSpPr/>
+              <p:nvPr/>
+            </p:nvSpPr>
+            <p:spPr>
+              <a:xfrm>
+                <a:off x="6963132" y="4575678"/>
+                <a:ext cx="303548" cy="191262"/>
+              </a:xfrm>
+              <a:prstGeom prst="roundRect">
+                <a:avLst/>
+              </a:prstGeom>
+              <a:solidFill>
+                <a:schemeClr val="bg1"/>
+              </a:solidFill>
+              <a:ln>
+                <a:noFill/>
+              </a:ln>
+            </p:spPr>
+            <p:style>
+              <a:lnRef idx="2">
+                <a:schemeClr val="accent1">
+                  <a:shade val="50000"/>
+                </a:schemeClr>
+              </a:lnRef>
+              <a:fillRef idx="1">
+                <a:schemeClr val="accent1"/>
+              </a:fillRef>
+              <a:effectRef idx="0">
+                <a:schemeClr val="accent1"/>
+              </a:effectRef>
+              <a:fontRef idx="minor">
+                <a:schemeClr val="lt1"/>
+              </a:fontRef>
+            </p:style>
+            <p:txBody>
+              <a:bodyPr rtlCol="0" anchor="ctr"/>
+              <a:lstStyle/>
+              <a:p>
+                <a:pPr algn="ctr"/>
+                <a:endParaRPr lang="pt-BR"/>
+              </a:p>
+            </p:txBody>
+          </p:sp>
+          <p:sp>
+            <p:nvSpPr>
+              <p:cNvPr id="15" name="Retângulo de cantos arredondados 14"/>
+              <p:cNvSpPr/>
+              <p:nvPr/>
+            </p:nvSpPr>
+            <p:spPr>
+              <a:xfrm>
+                <a:off x="6690400" y="2949654"/>
+                <a:ext cx="848927" cy="1669946"/>
+              </a:xfrm>
+              <a:prstGeom prst="roundRect">
+                <a:avLst/>
+              </a:prstGeom>
+              <a:solidFill>
+                <a:schemeClr val="bg1"/>
+              </a:solidFill>
+              <a:ln>
+                <a:noFill/>
+              </a:ln>
+            </p:spPr>
+            <p:style>
+              <a:lnRef idx="2">
+                <a:schemeClr val="accent1">
+                  <a:shade val="50000"/>
+                </a:schemeClr>
+              </a:lnRef>
+              <a:fillRef idx="1">
+                <a:schemeClr val="accent1"/>
+              </a:fillRef>
+              <a:effectRef idx="0">
+                <a:schemeClr val="accent1"/>
+              </a:effectRef>
+              <a:fontRef idx="minor">
+                <a:schemeClr val="lt1"/>
+              </a:fontRef>
+            </p:style>
+            <p:txBody>
+              <a:bodyPr rtlCol="0" anchor="ctr"/>
+              <a:lstStyle/>
+              <a:p>
+                <a:pPr algn="ctr"/>
+                <a:endParaRPr lang="pt-BR"/>
+              </a:p>
+            </p:txBody>
+          </p:sp>
+          <p:sp>
+            <p:nvSpPr>
+              <p:cNvPr id="29" name="Retângulo 28"/>
+              <p:cNvSpPr/>
+              <p:nvPr/>
+            </p:nvSpPr>
+            <p:spPr>
+              <a:xfrm>
+                <a:off x="6690485" y="3633999"/>
+                <a:ext cx="848842" cy="169309"/>
+              </a:xfrm>
+              <a:prstGeom prst="rect">
+                <a:avLst/>
+              </a:prstGeom>
+              <a:solidFill>
+                <a:srgbClr val="E96A5D"/>
+              </a:solidFill>
+              <a:ln>
+                <a:noFill/>
+              </a:ln>
+            </p:spPr>
+            <p:style>
+              <a:lnRef idx="2">
+                <a:schemeClr val="accent1">
+                  <a:shade val="50000"/>
+                </a:schemeClr>
+              </a:lnRef>
+              <a:fillRef idx="1">
+                <a:schemeClr val="accent1"/>
+              </a:fillRef>
+              <a:effectRef idx="0">
+                <a:schemeClr val="accent1"/>
+              </a:effectRef>
+              <a:fontRef idx="minor">
+                <a:schemeClr val="lt1"/>
+              </a:fontRef>
+            </p:style>
+            <p:txBody>
+              <a:bodyPr rtlCol="0" anchor="ctr"/>
+              <a:lstStyle/>
+              <a:p>
+                <a:pPr algn="ctr"/>
+                <a:endParaRPr lang="pt-BR"/>
+              </a:p>
+            </p:txBody>
+          </p:sp>
+          <p:sp>
+            <p:nvSpPr>
+              <p:cNvPr id="18" name="Retângulo de cantos arredondados 17"/>
+              <p:cNvSpPr/>
+              <p:nvPr/>
+            </p:nvSpPr>
+            <p:spPr>
+              <a:xfrm>
+                <a:off x="6690485" y="3647709"/>
+                <a:ext cx="848842" cy="971891"/>
+              </a:xfrm>
+              <a:prstGeom prst="roundRect">
+                <a:avLst>
+                  <a:gd name="adj" fmla="val 11537"/>
+                </a:avLst>
+              </a:prstGeom>
+              <a:solidFill>
+                <a:srgbClr val="E96A5D"/>
+              </a:solidFill>
+              <a:ln>
+                <a:noFill/>
+              </a:ln>
+            </p:spPr>
+            <p:style>
+              <a:lnRef idx="2">
+                <a:schemeClr val="accent1">
+                  <a:shade val="50000"/>
+                </a:schemeClr>
+              </a:lnRef>
+              <a:fillRef idx="1">
+                <a:schemeClr val="accent1"/>
+              </a:fillRef>
+              <a:effectRef idx="0">
+                <a:schemeClr val="accent1"/>
+              </a:effectRef>
+              <a:fontRef idx="minor">
+                <a:schemeClr val="lt1"/>
+              </a:fontRef>
+            </p:style>
+            <p:txBody>
+              <a:bodyPr rtlCol="0" anchor="ctr"/>
+              <a:lstStyle/>
+              <a:p>
+                <a:pPr algn="ctr"/>
+                <a:endParaRPr lang="pt-BR"/>
+              </a:p>
+            </p:txBody>
+          </p:sp>
+          <p:grpSp>
+            <p:nvGrpSpPr>
+              <p:cNvPr id="13" name="Grupo 12"/>
+              <p:cNvGrpSpPr/>
+              <p:nvPr/>
+            </p:nvGrpSpPr>
+            <p:grpSpPr>
+              <a:xfrm>
+                <a:off x="6497111" y="2061748"/>
+                <a:ext cx="1235506" cy="1008112"/>
+                <a:chOff x="5666983" y="1501572"/>
+                <a:chExt cx="1656184" cy="1351364"/>
+              </a:xfrm>
+            </p:grpSpPr>
+            <p:sp>
+              <p:nvSpPr>
+                <p:cNvPr id="11" name="Retângulo de cantos arredondados 10"/>
+                <p:cNvSpPr/>
+                <p:nvPr/>
+              </p:nvSpPr>
+              <p:spPr>
+                <a:xfrm>
+                  <a:off x="6099031" y="1537596"/>
+                  <a:ext cx="792088" cy="1026968"/>
+                </a:xfrm>
+                <a:prstGeom prst="roundRect">
+                  <a:avLst>
+                    <a:gd name="adj" fmla="val 0"/>
+                  </a:avLst>
+                </a:prstGeom>
+                <a:solidFill>
+                  <a:schemeClr val="bg1">
+                    <a:lumMod val="65000"/>
+                  </a:schemeClr>
+                </a:solidFill>
+                <a:ln>
+                  <a:noFill/>
+                </a:ln>
+              </p:spPr>
+              <p:style>
+                <a:lnRef idx="2">
+                  <a:schemeClr val="accent1">
+                    <a:shade val="50000"/>
+                  </a:schemeClr>
+                </a:lnRef>
+                <a:fillRef idx="1">
+                  <a:schemeClr val="accent1"/>
+                </a:fillRef>
+                <a:effectRef idx="0">
+                  <a:schemeClr val="accent1"/>
+                </a:effectRef>
+                <a:fontRef idx="minor">
+                  <a:schemeClr val="lt1"/>
+                </a:fontRef>
+              </p:style>
+              <p:txBody>
+                <a:bodyPr rtlCol="0" anchor="ctr"/>
+                <a:lstStyle/>
+                <a:p>
+                  <a:pPr algn="ctr"/>
+                  <a:endParaRPr lang="pt-BR"/>
+                </a:p>
+              </p:txBody>
+            </p:sp>
+            <p:sp>
+              <p:nvSpPr>
+                <p:cNvPr id="10" name="Retângulo de cantos arredondados 9"/>
+                <p:cNvSpPr/>
+                <p:nvPr/>
+              </p:nvSpPr>
+              <p:spPr>
+                <a:xfrm>
+                  <a:off x="5883007" y="1501572"/>
+                  <a:ext cx="1224136" cy="72008"/>
+                </a:xfrm>
+                <a:prstGeom prst="roundRect">
+                  <a:avLst/>
+                </a:prstGeom>
+                <a:solidFill>
+                  <a:schemeClr val="bg1">
+                    <a:lumMod val="50000"/>
+                  </a:schemeClr>
+                </a:solidFill>
+                <a:ln>
+                  <a:noFill/>
+                </a:ln>
+              </p:spPr>
+              <p:style>
+                <a:lnRef idx="2">
+                  <a:schemeClr val="accent1">
+                    <a:shade val="50000"/>
+                  </a:schemeClr>
+                </a:lnRef>
+                <a:fillRef idx="1">
+                  <a:schemeClr val="accent1"/>
+                </a:fillRef>
+                <a:effectRef idx="0">
+                  <a:schemeClr val="accent1"/>
+                </a:effectRef>
+                <a:fontRef idx="minor">
+                  <a:schemeClr val="lt1"/>
+                </a:fontRef>
+              </p:style>
+              <p:txBody>
+                <a:bodyPr rtlCol="0" anchor="ctr"/>
+                <a:lstStyle/>
+                <a:p>
+                  <a:pPr algn="ctr"/>
+                  <a:endParaRPr lang="pt-BR"/>
+                </a:p>
+              </p:txBody>
+            </p:sp>
+            <p:sp>
+              <p:nvSpPr>
+                <p:cNvPr id="14" name="Retângulo de cantos arredondados 13"/>
+                <p:cNvSpPr/>
+                <p:nvPr/>
+              </p:nvSpPr>
+              <p:spPr>
+                <a:xfrm rot="5400000">
+                  <a:off x="5883007" y="2088684"/>
+                  <a:ext cx="1224136" cy="72008"/>
+                </a:xfrm>
+                <a:prstGeom prst="roundRect">
+                  <a:avLst/>
+                </a:prstGeom>
+                <a:solidFill>
+                  <a:schemeClr val="bg1">
+                    <a:lumMod val="50000"/>
+                  </a:schemeClr>
+                </a:solidFill>
+                <a:ln>
+                  <a:noFill/>
+                </a:ln>
+              </p:spPr>
+              <p:style>
+                <a:lnRef idx="2">
+                  <a:schemeClr val="accent1">
+                    <a:shade val="50000"/>
+                  </a:schemeClr>
+                </a:lnRef>
+                <a:fillRef idx="1">
+                  <a:schemeClr val="accent1"/>
+                </a:fillRef>
+                <a:effectRef idx="0">
+                  <a:schemeClr val="accent1"/>
+                </a:effectRef>
+                <a:fontRef idx="minor">
+                  <a:schemeClr val="lt1"/>
+                </a:fontRef>
+              </p:style>
+              <p:txBody>
+                <a:bodyPr rtlCol="0" anchor="ctr"/>
+                <a:lstStyle/>
+                <a:p>
+                  <a:pPr algn="ctr"/>
+                  <a:endParaRPr lang="pt-BR"/>
+                </a:p>
+              </p:txBody>
+            </p:sp>
+            <p:sp>
+              <p:nvSpPr>
+                <p:cNvPr id="12" name="Retângulo de cantos arredondados 11"/>
+                <p:cNvSpPr/>
+                <p:nvPr/>
+              </p:nvSpPr>
+              <p:spPr>
+                <a:xfrm>
+                  <a:off x="5666983" y="2564564"/>
+                  <a:ext cx="1656184" cy="288372"/>
+                </a:xfrm>
+                <a:prstGeom prst="roundRect">
+                  <a:avLst/>
+                </a:prstGeom>
+                <a:solidFill>
+                  <a:schemeClr val="bg1">
+                    <a:lumMod val="95000"/>
+                  </a:schemeClr>
+                </a:solidFill>
+                <a:ln>
+                  <a:noFill/>
+                </a:ln>
+              </p:spPr>
+              <p:style>
+                <a:lnRef idx="2">
+                  <a:schemeClr val="accent1">
+                    <a:shade val="50000"/>
+                  </a:schemeClr>
+                </a:lnRef>
+                <a:fillRef idx="1">
+                  <a:schemeClr val="accent1"/>
+                </a:fillRef>
+                <a:effectRef idx="0">
+                  <a:schemeClr val="accent1"/>
+                </a:effectRef>
+                <a:fontRef idx="minor">
+                  <a:schemeClr val="lt1"/>
+                </a:fontRef>
+              </p:style>
+              <p:txBody>
+                <a:bodyPr rtlCol="0" anchor="ctr"/>
+                <a:lstStyle/>
+                <a:p>
+                  <a:pPr algn="ctr"/>
+                  <a:endParaRPr lang="pt-BR"/>
+                </a:p>
+              </p:txBody>
+            </p:sp>
+          </p:grpSp>
+          <p:sp>
+            <p:nvSpPr>
+              <p:cNvPr id="16" name="Retângulo de cantos arredondados 15"/>
+              <p:cNvSpPr/>
+              <p:nvPr/>
+            </p:nvSpPr>
+            <p:spPr>
+              <a:xfrm>
+                <a:off x="6690485" y="3140967"/>
+                <a:ext cx="257864" cy="45719"/>
+              </a:xfrm>
+              <a:prstGeom prst="roundRect">
+                <a:avLst/>
+              </a:prstGeom>
+              <a:solidFill>
+                <a:schemeClr val="bg1">
+                  <a:lumMod val="95000"/>
+                </a:schemeClr>
+              </a:solidFill>
+              <a:ln>
+                <a:noFill/>
+              </a:ln>
+            </p:spPr>
+            <p:style>
+              <a:lnRef idx="2">
+                <a:schemeClr val="accent1">
+                  <a:shade val="50000"/>
+                </a:schemeClr>
+              </a:lnRef>
+              <a:fillRef idx="1">
+                <a:schemeClr val="accent1"/>
+              </a:fillRef>
+              <a:effectRef idx="0">
+                <a:schemeClr val="accent1"/>
+              </a:effectRef>
+              <a:fontRef idx="minor">
+                <a:schemeClr val="lt1"/>
+              </a:fontRef>
+            </p:style>
+            <p:txBody>
+              <a:bodyPr rtlCol="0" anchor="ctr"/>
+              <a:lstStyle/>
+              <a:p>
+                <a:pPr algn="ctr"/>
+                <a:endParaRPr lang="pt-BR"/>
+              </a:p>
+            </p:txBody>
+          </p:sp>
+          <p:sp>
+            <p:nvSpPr>
+              <p:cNvPr id="19" name="Retângulo de cantos arredondados 18"/>
+              <p:cNvSpPr/>
+              <p:nvPr/>
+            </p:nvSpPr>
+            <p:spPr>
+              <a:xfrm>
+                <a:off x="6690485" y="3276177"/>
+                <a:ext cx="257864" cy="45719"/>
+              </a:xfrm>
+              <a:prstGeom prst="roundRect">
+                <a:avLst/>
+              </a:prstGeom>
+              <a:solidFill>
+                <a:schemeClr val="bg1">
+                  <a:lumMod val="95000"/>
+                </a:schemeClr>
+              </a:solidFill>
+              <a:ln>
+                <a:noFill/>
+              </a:ln>
+            </p:spPr>
+            <p:style>
+              <a:lnRef idx="2">
+                <a:schemeClr val="accent1">
+                  <a:shade val="50000"/>
+                </a:schemeClr>
+              </a:lnRef>
+              <a:fillRef idx="1">
+                <a:schemeClr val="accent1"/>
+              </a:fillRef>
+              <a:effectRef idx="0">
+                <a:schemeClr val="accent1"/>
+              </a:effectRef>
+              <a:fontRef idx="minor">
+                <a:schemeClr val="lt1"/>
+              </a:fontRef>
+            </p:style>
+            <p:txBody>
+              <a:bodyPr rtlCol="0" anchor="ctr"/>
+              <a:lstStyle/>
+              <a:p>
+                <a:pPr algn="ctr"/>
+                <a:endParaRPr lang="pt-BR"/>
+              </a:p>
+            </p:txBody>
+          </p:sp>
+          <p:sp>
+            <p:nvSpPr>
+              <p:cNvPr id="20" name="Retângulo de cantos arredondados 19"/>
+              <p:cNvSpPr/>
+              <p:nvPr/>
+            </p:nvSpPr>
+            <p:spPr>
+              <a:xfrm>
+                <a:off x="6690485" y="3411387"/>
+                <a:ext cx="257864" cy="45719"/>
+              </a:xfrm>
+              <a:prstGeom prst="roundRect">
+                <a:avLst/>
+              </a:prstGeom>
+              <a:solidFill>
+                <a:schemeClr val="bg1">
+                  <a:lumMod val="95000"/>
+                </a:schemeClr>
+              </a:solidFill>
+              <a:ln>
+                <a:noFill/>
+              </a:ln>
+            </p:spPr>
+            <p:style>
+              <a:lnRef idx="2">
+                <a:schemeClr val="accent1">
+                  <a:shade val="50000"/>
+                </a:schemeClr>
+              </a:lnRef>
+              <a:fillRef idx="1">
+                <a:schemeClr val="accent1"/>
+              </a:fillRef>
+              <a:effectRef idx="0">
+                <a:schemeClr val="accent1"/>
+              </a:effectRef>
+              <a:fontRef idx="minor">
+                <a:schemeClr val="lt1"/>
+              </a:fontRef>
+            </p:style>
+            <p:txBody>
+              <a:bodyPr rtlCol="0" anchor="ctr"/>
+              <a:lstStyle/>
+              <a:p>
+                <a:pPr algn="ctr"/>
+                <a:endParaRPr lang="pt-BR"/>
+              </a:p>
+            </p:txBody>
+          </p:sp>
+          <p:sp>
+            <p:nvSpPr>
+              <p:cNvPr id="21" name="Retângulo de cantos arredondados 20"/>
+              <p:cNvSpPr/>
+              <p:nvPr/>
+            </p:nvSpPr>
+            <p:spPr>
+              <a:xfrm>
+                <a:off x="6690485" y="3546598"/>
+                <a:ext cx="257864" cy="45719"/>
+              </a:xfrm>
+              <a:prstGeom prst="roundRect">
+                <a:avLst/>
+              </a:prstGeom>
+              <a:solidFill>
+                <a:schemeClr val="bg1">
+                  <a:lumMod val="95000"/>
+                </a:schemeClr>
+              </a:solidFill>
+              <a:ln>
+                <a:noFill/>
+              </a:ln>
+            </p:spPr>
+            <p:style>
+              <a:lnRef idx="2">
+                <a:schemeClr val="accent1">
+                  <a:shade val="50000"/>
+                </a:schemeClr>
+              </a:lnRef>
+              <a:fillRef idx="1">
+                <a:schemeClr val="accent1"/>
+              </a:fillRef>
+              <a:effectRef idx="0">
+                <a:schemeClr val="accent1"/>
+              </a:effectRef>
+              <a:fontRef idx="minor">
+                <a:schemeClr val="lt1"/>
+              </a:fontRef>
+            </p:style>
+            <p:txBody>
+              <a:bodyPr rtlCol="0" anchor="ctr"/>
+              <a:lstStyle/>
+              <a:p>
+                <a:pPr algn="ctr"/>
+                <a:endParaRPr lang="pt-BR"/>
+              </a:p>
+            </p:txBody>
+          </p:sp>
+          <p:sp>
+            <p:nvSpPr>
+              <p:cNvPr id="23" name="Retângulo de cantos arredondados 22"/>
+              <p:cNvSpPr/>
+              <p:nvPr/>
+            </p:nvSpPr>
+            <p:spPr>
+              <a:xfrm>
+                <a:off x="6690485" y="3817018"/>
+                <a:ext cx="257864" cy="45719"/>
+              </a:xfrm>
+              <a:prstGeom prst="roundRect">
+                <a:avLst/>
+              </a:prstGeom>
+              <a:solidFill>
+                <a:schemeClr val="bg1">
+                  <a:lumMod val="95000"/>
+                </a:schemeClr>
+              </a:solidFill>
+              <a:ln>
+                <a:noFill/>
+              </a:ln>
+            </p:spPr>
+            <p:style>
+              <a:lnRef idx="2">
+                <a:schemeClr val="accent1">
+                  <a:shade val="50000"/>
+                </a:schemeClr>
+              </a:lnRef>
+              <a:fillRef idx="1">
+                <a:schemeClr val="accent1"/>
+              </a:fillRef>
+              <a:effectRef idx="0">
+                <a:schemeClr val="accent1"/>
+              </a:effectRef>
+              <a:fontRef idx="minor">
+                <a:schemeClr val="lt1"/>
+              </a:fontRef>
+            </p:style>
+            <p:txBody>
+              <a:bodyPr rtlCol="0" anchor="ctr"/>
+              <a:lstStyle/>
+              <a:p>
+                <a:pPr algn="ctr"/>
+                <a:endParaRPr lang="pt-BR"/>
+              </a:p>
+            </p:txBody>
+          </p:sp>
+          <p:sp>
+            <p:nvSpPr>
+              <p:cNvPr id="24" name="Retângulo de cantos arredondados 23"/>
+              <p:cNvSpPr/>
+              <p:nvPr/>
+            </p:nvSpPr>
+            <p:spPr>
+              <a:xfrm>
+                <a:off x="6688936" y="3681808"/>
+                <a:ext cx="257864" cy="45719"/>
+              </a:xfrm>
+              <a:prstGeom prst="roundRect">
+                <a:avLst/>
+              </a:prstGeom>
+              <a:solidFill>
+                <a:schemeClr val="bg1">
+                  <a:lumMod val="95000"/>
+                </a:schemeClr>
+              </a:solidFill>
+              <a:ln>
+                <a:noFill/>
+              </a:ln>
+            </p:spPr>
+            <p:style>
+              <a:lnRef idx="2">
+                <a:schemeClr val="accent1">
+                  <a:shade val="50000"/>
+                </a:schemeClr>
+              </a:lnRef>
+              <a:fillRef idx="1">
+                <a:schemeClr val="accent1"/>
+              </a:fillRef>
+              <a:effectRef idx="0">
+                <a:schemeClr val="accent1"/>
+              </a:effectRef>
+              <a:fontRef idx="minor">
+                <a:schemeClr val="lt1"/>
+              </a:fontRef>
+            </p:style>
+            <p:txBody>
+              <a:bodyPr rtlCol="0" anchor="ctr"/>
+              <a:lstStyle/>
+              <a:p>
+                <a:pPr algn="ctr"/>
+                <a:endParaRPr lang="pt-BR"/>
+              </a:p>
+            </p:txBody>
+          </p:sp>
+          <p:sp>
+            <p:nvSpPr>
+              <p:cNvPr id="25" name="Retângulo de cantos arredondados 24"/>
+              <p:cNvSpPr/>
+              <p:nvPr/>
+            </p:nvSpPr>
+            <p:spPr>
+              <a:xfrm>
+                <a:off x="6689157" y="3952228"/>
+                <a:ext cx="257864" cy="45719"/>
+              </a:xfrm>
+              <a:prstGeom prst="roundRect">
+                <a:avLst/>
+              </a:prstGeom>
+              <a:solidFill>
+                <a:schemeClr val="bg1">
+                  <a:lumMod val="95000"/>
+                </a:schemeClr>
+              </a:solidFill>
+              <a:ln>
+                <a:noFill/>
+              </a:ln>
+            </p:spPr>
+            <p:style>
+              <a:lnRef idx="2">
+                <a:schemeClr val="accent1">
+                  <a:shade val="50000"/>
+                </a:schemeClr>
+              </a:lnRef>
+              <a:fillRef idx="1">
+                <a:schemeClr val="accent1"/>
+              </a:fillRef>
+              <a:effectRef idx="0">
+                <a:schemeClr val="accent1"/>
+              </a:effectRef>
+              <a:fontRef idx="minor">
+                <a:schemeClr val="lt1"/>
+              </a:fontRef>
+            </p:style>
+            <p:txBody>
+              <a:bodyPr rtlCol="0" anchor="ctr"/>
+              <a:lstStyle/>
+              <a:p>
+                <a:pPr algn="ctr"/>
+                <a:endParaRPr lang="pt-BR"/>
+              </a:p>
+            </p:txBody>
+          </p:sp>
+          <p:sp>
+            <p:nvSpPr>
+              <p:cNvPr id="26" name="Retângulo de cantos arredondados 25"/>
+              <p:cNvSpPr/>
+              <p:nvPr/>
+            </p:nvSpPr>
+            <p:spPr>
+              <a:xfrm>
+                <a:off x="6690262" y="4087438"/>
+                <a:ext cx="257864" cy="45719"/>
+              </a:xfrm>
+              <a:prstGeom prst="roundRect">
+                <a:avLst/>
+              </a:prstGeom>
+              <a:solidFill>
+                <a:schemeClr val="bg1">
+                  <a:lumMod val="95000"/>
+                </a:schemeClr>
+              </a:solidFill>
+              <a:ln>
+                <a:noFill/>
+              </a:ln>
+            </p:spPr>
+            <p:style>
+              <a:lnRef idx="2">
+                <a:schemeClr val="accent1">
+                  <a:shade val="50000"/>
+                </a:schemeClr>
+              </a:lnRef>
+              <a:fillRef idx="1">
+                <a:schemeClr val="accent1"/>
+              </a:fillRef>
+              <a:effectRef idx="0">
+                <a:schemeClr val="accent1"/>
+              </a:effectRef>
+              <a:fontRef idx="minor">
+                <a:schemeClr val="lt1"/>
+              </a:fontRef>
+            </p:style>
+            <p:txBody>
+              <a:bodyPr rtlCol="0" anchor="ctr"/>
+              <a:lstStyle/>
+              <a:p>
+                <a:pPr algn="ctr"/>
+                <a:endParaRPr lang="pt-BR"/>
+              </a:p>
+            </p:txBody>
+          </p:sp>
+          <p:sp>
+            <p:nvSpPr>
+              <p:cNvPr id="27" name="Retângulo de cantos arredondados 26"/>
+              <p:cNvSpPr/>
+              <p:nvPr/>
+            </p:nvSpPr>
+            <p:spPr>
+              <a:xfrm>
+                <a:off x="6688715" y="4222648"/>
+                <a:ext cx="257864" cy="45719"/>
+              </a:xfrm>
+              <a:prstGeom prst="roundRect">
+                <a:avLst/>
+              </a:prstGeom>
+              <a:solidFill>
+                <a:schemeClr val="bg1">
+                  <a:lumMod val="95000"/>
+                </a:schemeClr>
+              </a:solidFill>
+              <a:ln>
+                <a:noFill/>
+              </a:ln>
+            </p:spPr>
+            <p:style>
+              <a:lnRef idx="2">
+                <a:schemeClr val="accent1">
+                  <a:shade val="50000"/>
+                </a:schemeClr>
+              </a:lnRef>
+              <a:fillRef idx="1">
+                <a:schemeClr val="accent1"/>
+              </a:fillRef>
+              <a:effectRef idx="0">
+                <a:schemeClr val="accent1"/>
+              </a:effectRef>
+              <a:fontRef idx="minor">
+                <a:schemeClr val="lt1"/>
+              </a:fontRef>
+            </p:style>
+            <p:txBody>
+              <a:bodyPr rtlCol="0" anchor="ctr"/>
+              <a:lstStyle/>
+              <a:p>
+                <a:pPr algn="ctr"/>
+                <a:endParaRPr lang="pt-BR"/>
+              </a:p>
+            </p:txBody>
+          </p:sp>
+          <p:sp>
+            <p:nvSpPr>
+              <p:cNvPr id="28" name="Retângulo de cantos arredondados 27"/>
+              <p:cNvSpPr/>
+              <p:nvPr/>
+            </p:nvSpPr>
+            <p:spPr>
+              <a:xfrm>
+                <a:off x="6688715" y="4357855"/>
+                <a:ext cx="257864" cy="45719"/>
+              </a:xfrm>
+              <a:prstGeom prst="roundRect">
+                <a:avLst/>
+              </a:prstGeom>
+              <a:solidFill>
+                <a:schemeClr val="bg1">
+                  <a:lumMod val="95000"/>
+                </a:schemeClr>
+              </a:solidFill>
+              <a:ln>
+                <a:noFill/>
+              </a:ln>
+            </p:spPr>
+            <p:style>
+              <a:lnRef idx="2">
+                <a:schemeClr val="accent1">
+                  <a:shade val="50000"/>
+                </a:schemeClr>
+              </a:lnRef>
+              <a:fillRef idx="1">
+                <a:schemeClr val="accent1"/>
+              </a:fillRef>
+              <a:effectRef idx="0">
+                <a:schemeClr val="accent1"/>
+              </a:effectRef>
+              <a:fontRef idx="minor">
+                <a:schemeClr val="lt1"/>
+              </a:fontRef>
+            </p:style>
+            <p:txBody>
+              <a:bodyPr rtlCol="0" anchor="ctr"/>
+              <a:lstStyle/>
+              <a:p>
+                <a:pPr algn="ctr"/>
+                <a:endParaRPr lang="pt-BR"/>
+              </a:p>
+            </p:txBody>
+          </p:sp>
+          <p:sp>
+            <p:nvSpPr>
+              <p:cNvPr id="1025" name="Triângulo retângulo 1024"/>
+              <p:cNvSpPr/>
+              <p:nvPr/>
+            </p:nvSpPr>
+            <p:spPr>
+              <a:xfrm rot="10800000">
+                <a:off x="7088005" y="5229200"/>
+                <a:ext cx="45719" cy="298662"/>
+              </a:xfrm>
+              <a:prstGeom prst="rtTriangle">
+                <a:avLst/>
+              </a:prstGeom>
+              <a:solidFill>
+                <a:schemeClr val="bg1"/>
+              </a:solidFill>
+              <a:ln>
+                <a:noFill/>
+              </a:ln>
+            </p:spPr>
+            <p:style>
+              <a:lnRef idx="2">
+                <a:schemeClr val="accent1">
+                  <a:shade val="50000"/>
+                </a:schemeClr>
+              </a:lnRef>
+              <a:fillRef idx="1">
+                <a:schemeClr val="accent1"/>
+              </a:fillRef>
+              <a:effectRef idx="0">
+                <a:schemeClr val="accent1"/>
+              </a:effectRef>
+              <a:fontRef idx="minor">
+                <a:schemeClr val="lt1"/>
+              </a:fontRef>
+            </p:style>
+            <p:txBody>
+              <a:bodyPr rtlCol="0" anchor="ctr"/>
+              <a:lstStyle/>
+              <a:p>
+                <a:pPr algn="ctr"/>
+                <a:endParaRPr lang="pt-BR"/>
+              </a:p>
+            </p:txBody>
+          </p:sp>
+        </p:grpSp>
+      </p:grpSp>
+    </p:spTree>
+    <p:extLst>
+      <p:ext uri="{BB962C8B-B14F-4D97-AF65-F5344CB8AC3E}">
+        <p14:creationId xmlns:p14="http://schemas.microsoft.com/office/powerpoint/2010/main" val="3571698888"/>
+      </p:ext>
+    </p:extLst>
+  </p:cSld>
+  <p:clrMapOvr>
+    <a:masterClrMapping/>
+  </p:clrMapOvr>
+</p:sld>
+</file>
+
+<file path=ppt/slides/slide3.xml><?xml version="1.0" encoding="utf-8"?>
+<p:sld xmlns:a="http://schemas.openxmlformats.org/drawingml/2006/main" xmlns:r="http://schemas.openxmlformats.org/officeDocument/2006/relationships" xmlns:p="http://schemas.openxmlformats.org/presentationml/2006/main">
+  <p:cSld>
+    <p:spTree>
+      <p:nvGrpSpPr>
+        <p:cNvPr id="1" name=""/>
+        <p:cNvGrpSpPr/>
+        <p:nvPr/>
+      </p:nvGrpSpPr>
+      <p:grpSpPr>
+        <a:xfrm>
+          <a:off x="0" y="0"/>
+          <a:ext cx="0" cy="0"/>
+          <a:chOff x="0" y="0"/>
+          <a:chExt cx="0" cy="0"/>
+        </a:xfrm>
+      </p:grpSpPr>
+      <p:grpSp>
+        <p:nvGrpSpPr>
+          <p:cNvPr id="17" name="Grupo 16"/>
+          <p:cNvGrpSpPr/>
+          <p:nvPr/>
+        </p:nvGrpSpPr>
+        <p:grpSpPr>
+          <a:xfrm>
+            <a:off x="2842028" y="2111869"/>
+            <a:ext cx="3672340" cy="2649159"/>
+            <a:chOff x="4726488" y="1544913"/>
+            <a:chExt cx="3672340" cy="2649159"/>
+          </a:xfrm>
+        </p:grpSpPr>
+        <p:grpSp>
+          <p:nvGrpSpPr>
+            <p:cNvPr id="16" name="Grupo 15"/>
+            <p:cNvGrpSpPr/>
+            <p:nvPr/>
+          </p:nvGrpSpPr>
+          <p:grpSpPr>
+            <a:xfrm>
+              <a:off x="4726488" y="1544913"/>
+              <a:ext cx="3672340" cy="2649159"/>
+              <a:chOff x="4805387" y="1987971"/>
+              <a:chExt cx="3672340" cy="2649159"/>
+            </a:xfrm>
+          </p:grpSpPr>
+          <p:sp>
+            <p:nvSpPr>
+              <p:cNvPr id="15" name="Retângulo de cantos arredondados 14"/>
+              <p:cNvSpPr/>
+              <p:nvPr/>
+            </p:nvSpPr>
+            <p:spPr>
+              <a:xfrm>
+                <a:off x="5844290" y="1987971"/>
+                <a:ext cx="1592722" cy="2498598"/>
+              </a:xfrm>
+              <a:prstGeom prst="roundRect">
+                <a:avLst>
+                  <a:gd name="adj" fmla="val 50000"/>
+                </a:avLst>
+              </a:prstGeom>
+              <a:solidFill>
+                <a:schemeClr val="bg1">
+                  <a:lumMod val="75000"/>
+                </a:schemeClr>
+              </a:solidFill>
+              <a:ln>
+                <a:noFill/>
+              </a:ln>
+            </p:spPr>
+            <p:style>
+              <a:lnRef idx="2">
+                <a:schemeClr val="accent1">
+                  <a:shade val="50000"/>
+                </a:schemeClr>
+              </a:lnRef>
+              <a:fillRef idx="1">
+                <a:schemeClr val="accent1"/>
+              </a:fillRef>
+              <a:effectRef idx="0">
+                <a:schemeClr val="accent1"/>
+              </a:effectRef>
+              <a:fontRef idx="minor">
+                <a:schemeClr val="lt1"/>
+              </a:fontRef>
+            </p:style>
+            <p:txBody>
+              <a:bodyPr rtlCol="0" anchor="ctr"/>
+              <a:lstStyle/>
+              <a:p>
+                <a:pPr algn="ctr"/>
+                <a:endParaRPr lang="pt-BR"/>
+              </a:p>
+            </p:txBody>
+          </p:sp>
+          <p:sp>
+            <p:nvSpPr>
+              <p:cNvPr id="5" name="Retângulo 4"/>
+              <p:cNvSpPr/>
+              <p:nvPr/>
+            </p:nvSpPr>
+            <p:spPr>
+              <a:xfrm rot="18835685">
+                <a:off x="5805202" y="2826732"/>
+                <a:ext cx="2241493" cy="1379303"/>
+              </a:xfrm>
+              <a:custGeom>
+                <a:avLst/>
+                <a:gdLst/>
+                <a:ahLst/>
+                <a:cxnLst/>
+                <a:rect l="l" t="t" r="r" b="b"/>
+                <a:pathLst>
+                  <a:path w="2241493" h="1379303">
+                    <a:moveTo>
+                      <a:pt x="2241493" y="0"/>
+                    </a:moveTo>
+                    <a:cubicBezTo>
+                      <a:pt x="2232791" y="193394"/>
+                      <a:pt x="2151674" y="383150"/>
+                      <a:pt x="2001264" y="528034"/>
+                    </a:cubicBezTo>
+                    <a:lnTo>
+                      <a:pt x="1348842" y="1156490"/>
+                    </a:lnTo>
+                    <a:cubicBezTo>
+                      <a:pt x="1032080" y="1461616"/>
+                      <a:pt x="527941" y="1452183"/>
+                      <a:pt x="222815" y="1135421"/>
+                    </a:cubicBezTo>
+                    <a:cubicBezTo>
+                      <a:pt x="-82311" y="818659"/>
+                      <a:pt x="-72879" y="314520"/>
+                      <a:pt x="243883" y="9394"/>
+                    </a:cubicBezTo>
+                    <a:lnTo>
+                      <a:pt x="253636" y="0"/>
+                    </a:lnTo>
+                    <a:close/>
+                  </a:path>
+                </a:pathLst>
+              </a:custGeom>
+              <a:solidFill>
+                <a:schemeClr val="bg1">
+                  <a:lumMod val="65000"/>
+                </a:schemeClr>
+              </a:solidFill>
+              <a:ln>
+                <a:noFill/>
+              </a:ln>
+            </p:spPr>
+            <p:style>
+              <a:lnRef idx="2">
+                <a:schemeClr val="accent1">
+                  <a:shade val="50000"/>
+                </a:schemeClr>
+              </a:lnRef>
+              <a:fillRef idx="1">
+                <a:schemeClr val="accent1"/>
+              </a:fillRef>
+              <a:effectRef idx="0">
+                <a:schemeClr val="accent1"/>
+              </a:effectRef>
+              <a:fontRef idx="minor">
+                <a:schemeClr val="lt1"/>
+              </a:fontRef>
+            </p:style>
+            <p:txBody>
+              <a:bodyPr rtlCol="0" anchor="ctr"/>
+              <a:lstStyle/>
+              <a:p>
+                <a:pPr algn="ctr"/>
+                <a:endParaRPr lang="pt-BR"/>
+              </a:p>
+            </p:txBody>
+          </p:sp>
+          <p:sp>
+            <p:nvSpPr>
+              <p:cNvPr id="3" name="Elipse 2"/>
+              <p:cNvSpPr/>
+              <p:nvPr/>
+            </p:nvSpPr>
+            <p:spPr>
+              <a:xfrm>
+                <a:off x="4805387" y="3791255"/>
+                <a:ext cx="1076491" cy="788142"/>
+              </a:xfrm>
+              <a:custGeom>
+                <a:avLst/>
+                <a:gdLst/>
+                <a:ahLst/>
+                <a:cxnLst/>
+                <a:rect l="l" t="t" r="r" b="b"/>
+                <a:pathLst>
+                  <a:path w="1076491" h="559106">
+                    <a:moveTo>
+                      <a:pt x="1920" y="521014"/>
+                    </a:moveTo>
+                    <a:lnTo>
+                      <a:pt x="1920" y="559106"/>
+                    </a:lnTo>
+                    <a:cubicBezTo>
+                      <a:pt x="111" y="552821"/>
+                      <a:pt x="0" y="546454"/>
+                      <a:pt x="0" y="540060"/>
+                    </a:cubicBezTo>
+                    <a:close/>
+                    <a:moveTo>
+                      <a:pt x="540060" y="0"/>
+                    </a:moveTo>
+                    <a:cubicBezTo>
+                      <a:pt x="826174" y="0"/>
+                      <a:pt x="1060323" y="222491"/>
+                      <a:pt x="1076491" y="504056"/>
+                    </a:cubicBezTo>
+                    <a:lnTo>
+                      <a:pt x="3630" y="504056"/>
+                    </a:lnTo>
+                    <a:cubicBezTo>
+                      <a:pt x="19798" y="222491"/>
+                      <a:pt x="253946" y="0"/>
+                      <a:pt x="540060" y="0"/>
+                    </a:cubicBezTo>
+                    <a:close/>
+                  </a:path>
+                </a:pathLst>
+              </a:custGeom>
+              <a:solidFill>
+                <a:schemeClr val="accent3">
+                  <a:lumMod val="50000"/>
+                </a:schemeClr>
+              </a:solidFill>
+              <a:ln>
+                <a:noFill/>
+              </a:ln>
+            </p:spPr>
+            <p:style>
+              <a:lnRef idx="2">
+                <a:schemeClr val="accent1">
+                  <a:shade val="50000"/>
+                </a:schemeClr>
+              </a:lnRef>
+              <a:fillRef idx="1">
+                <a:schemeClr val="accent1"/>
+              </a:fillRef>
+              <a:effectRef idx="0">
+                <a:schemeClr val="accent1"/>
+              </a:effectRef>
+              <a:fontRef idx="minor">
+                <a:schemeClr val="lt1"/>
+              </a:fontRef>
+            </p:style>
+            <p:txBody>
+              <a:bodyPr rtlCol="0" anchor="ctr"/>
+              <a:lstStyle/>
+              <a:p>
+                <a:pPr algn="ctr"/>
+                <a:endParaRPr lang="pt-BR" u="sng"/>
+              </a:p>
+            </p:txBody>
+          </p:sp>
+          <p:sp>
+            <p:nvSpPr>
+              <p:cNvPr id="6" name="Elipse 5"/>
+              <p:cNvSpPr/>
+              <p:nvPr/>
+            </p:nvSpPr>
+            <p:spPr>
+              <a:xfrm>
+                <a:off x="5343633" y="3592621"/>
+                <a:ext cx="1080120" cy="913553"/>
+              </a:xfrm>
+              <a:custGeom>
+                <a:avLst/>
+                <a:gdLst/>
+                <a:ahLst/>
+                <a:cxnLst/>
+                <a:rect l="l" t="t" r="r" b="b"/>
+                <a:pathLst>
+                  <a:path w="1080120" h="648072">
+                    <a:moveTo>
+                      <a:pt x="540060" y="0"/>
+                    </a:moveTo>
+                    <a:cubicBezTo>
+                      <a:pt x="838327" y="0"/>
+                      <a:pt x="1080120" y="241793"/>
+                      <a:pt x="1080120" y="540060"/>
+                    </a:cubicBezTo>
+                    <a:lnTo>
+                      <a:pt x="1069232" y="648072"/>
+                    </a:lnTo>
+                    <a:lnTo>
+                      <a:pt x="10889" y="648072"/>
+                    </a:lnTo>
+                    <a:cubicBezTo>
+                      <a:pt x="3720" y="613184"/>
+                      <a:pt x="0" y="577056"/>
+                      <a:pt x="0" y="540060"/>
+                    </a:cubicBezTo>
+                    <a:cubicBezTo>
+                      <a:pt x="0" y="241793"/>
+                      <a:pt x="241793" y="0"/>
+                      <a:pt x="540060" y="0"/>
+                    </a:cubicBezTo>
+                    <a:close/>
+                  </a:path>
+                </a:pathLst>
+              </a:custGeom>
+              <a:solidFill>
+                <a:schemeClr val="accent3">
+                  <a:lumMod val="50000"/>
+                </a:schemeClr>
+              </a:solidFill>
+              <a:ln>
+                <a:noFill/>
+              </a:ln>
+            </p:spPr>
+            <p:style>
+              <a:lnRef idx="2">
+                <a:schemeClr val="accent1">
+                  <a:shade val="50000"/>
+                </a:schemeClr>
+              </a:lnRef>
+              <a:fillRef idx="1">
+                <a:schemeClr val="accent1"/>
+              </a:fillRef>
+              <a:effectRef idx="0">
+                <a:schemeClr val="accent1"/>
+              </a:effectRef>
+              <a:fontRef idx="minor">
+                <a:schemeClr val="lt1"/>
+              </a:fontRef>
+            </p:style>
+            <p:txBody>
+              <a:bodyPr rtlCol="0" anchor="ctr"/>
+              <a:lstStyle/>
+              <a:p>
+                <a:pPr algn="ctr"/>
+                <a:endParaRPr lang="pt-BR" u="sng"/>
+              </a:p>
+            </p:txBody>
+          </p:sp>
+          <p:sp>
+            <p:nvSpPr>
+              <p:cNvPr id="7" name="Elipse 6"/>
+              <p:cNvSpPr/>
+              <p:nvPr/>
+            </p:nvSpPr>
+            <p:spPr>
+              <a:xfrm>
+                <a:off x="6089186" y="3808528"/>
+                <a:ext cx="1071017" cy="697646"/>
+              </a:xfrm>
+              <a:custGeom>
+                <a:avLst/>
+                <a:gdLst/>
+                <a:ahLst/>
+                <a:cxnLst/>
+                <a:rect l="l" t="t" r="r" b="b"/>
+                <a:pathLst>
+                  <a:path w="1071017" h="494908">
+                    <a:moveTo>
+                      <a:pt x="535508" y="0"/>
+                    </a:moveTo>
+                    <a:cubicBezTo>
+                      <a:pt x="818494" y="0"/>
+                      <a:pt x="1050644" y="217652"/>
+                      <a:pt x="1071017" y="494908"/>
+                    </a:cubicBezTo>
+                    <a:lnTo>
+                      <a:pt x="0" y="494908"/>
+                    </a:lnTo>
+                    <a:cubicBezTo>
+                      <a:pt x="20372" y="217652"/>
+                      <a:pt x="252523" y="0"/>
+                      <a:pt x="535508" y="0"/>
+                    </a:cubicBezTo>
+                    <a:close/>
+                  </a:path>
+                </a:pathLst>
+              </a:custGeom>
+              <a:solidFill>
+                <a:schemeClr val="accent3">
+                  <a:lumMod val="50000"/>
+                </a:schemeClr>
+              </a:solidFill>
+              <a:ln>
+                <a:noFill/>
+              </a:ln>
+            </p:spPr>
+            <p:style>
+              <a:lnRef idx="2">
+                <a:schemeClr val="accent1">
+                  <a:shade val="50000"/>
+                </a:schemeClr>
+              </a:lnRef>
+              <a:fillRef idx="1">
+                <a:schemeClr val="accent1"/>
+              </a:fillRef>
+              <a:effectRef idx="0">
+                <a:schemeClr val="accent1"/>
+              </a:effectRef>
+              <a:fontRef idx="minor">
+                <a:schemeClr val="lt1"/>
+              </a:fontRef>
+            </p:style>
+            <p:txBody>
+              <a:bodyPr rtlCol="0" anchor="ctr"/>
+              <a:lstStyle/>
+              <a:p>
+                <a:pPr algn="ctr"/>
+                <a:endParaRPr lang="pt-BR" u="sng"/>
+              </a:p>
+            </p:txBody>
+          </p:sp>
+          <p:sp>
+            <p:nvSpPr>
+              <p:cNvPr id="8" name="Elipse 7"/>
+              <p:cNvSpPr/>
+              <p:nvPr/>
+            </p:nvSpPr>
+            <p:spPr>
+              <a:xfrm>
+                <a:off x="6925949" y="3612226"/>
+                <a:ext cx="1080120" cy="893395"/>
+              </a:xfrm>
+              <a:custGeom>
+                <a:avLst/>
+                <a:gdLst/>
+                <a:ahLst/>
+                <a:cxnLst/>
+                <a:rect l="l" t="t" r="r" b="b"/>
+                <a:pathLst>
+                  <a:path w="1080120" h="633772">
+                    <a:moveTo>
+                      <a:pt x="540060" y="0"/>
+                    </a:moveTo>
+                    <a:cubicBezTo>
+                      <a:pt x="838327" y="0"/>
+                      <a:pt x="1080120" y="241793"/>
+                      <a:pt x="1080120" y="540060"/>
+                    </a:cubicBezTo>
+                    <a:lnTo>
+                      <a:pt x="1070673" y="633772"/>
+                    </a:lnTo>
+                    <a:lnTo>
+                      <a:pt x="9447" y="633772"/>
+                    </a:lnTo>
+                    <a:cubicBezTo>
+                      <a:pt x="2791" y="603492"/>
+                      <a:pt x="0" y="572102"/>
+                      <a:pt x="0" y="540060"/>
+                    </a:cubicBezTo>
+                    <a:cubicBezTo>
+                      <a:pt x="0" y="241793"/>
+                      <a:pt x="241793" y="0"/>
+                      <a:pt x="540060" y="0"/>
+                    </a:cubicBezTo>
+                    <a:close/>
+                  </a:path>
+                </a:pathLst>
+              </a:custGeom>
+              <a:solidFill>
+                <a:schemeClr val="accent3">
+                  <a:lumMod val="50000"/>
+                </a:schemeClr>
+              </a:solidFill>
+              <a:ln>
+                <a:noFill/>
+              </a:ln>
+            </p:spPr>
+            <p:style>
+              <a:lnRef idx="2">
+                <a:schemeClr val="accent1">
+                  <a:shade val="50000"/>
+                </a:schemeClr>
+              </a:lnRef>
+              <a:fillRef idx="1">
+                <a:schemeClr val="accent1"/>
+              </a:fillRef>
+              <a:effectRef idx="0">
+                <a:schemeClr val="accent1"/>
+              </a:effectRef>
+              <a:fontRef idx="minor">
+                <a:schemeClr val="lt1"/>
+              </a:fontRef>
+            </p:style>
+            <p:txBody>
+              <a:bodyPr rtlCol="0" anchor="ctr"/>
+              <a:lstStyle/>
+              <a:p>
+                <a:pPr algn="ctr"/>
+                <a:endParaRPr lang="pt-BR" u="sng"/>
+              </a:p>
+            </p:txBody>
+          </p:sp>
+          <p:sp>
+            <p:nvSpPr>
+              <p:cNvPr id="9" name="Elipse 8"/>
+              <p:cNvSpPr/>
+              <p:nvPr/>
+            </p:nvSpPr>
+            <p:spPr>
+              <a:xfrm>
+                <a:off x="7468947" y="4010463"/>
+                <a:ext cx="1008780" cy="495711"/>
+              </a:xfrm>
+              <a:custGeom>
+                <a:avLst/>
+                <a:gdLst/>
+                <a:ahLst/>
+                <a:cxnLst/>
+                <a:rect l="l" t="t" r="r" b="b"/>
+                <a:pathLst>
+                  <a:path w="1008780" h="351656">
+                    <a:moveTo>
+                      <a:pt x="504390" y="0"/>
+                    </a:moveTo>
+                    <a:cubicBezTo>
+                      <a:pt x="736157" y="0"/>
+                      <a:pt x="933824" y="145994"/>
+                      <a:pt x="1008780" y="351656"/>
+                    </a:cubicBezTo>
+                    <a:lnTo>
+                      <a:pt x="0" y="351656"/>
+                    </a:lnTo>
+                    <a:cubicBezTo>
+                      <a:pt x="74956" y="145994"/>
+                      <a:pt x="272624" y="0"/>
+                      <a:pt x="504390" y="0"/>
+                    </a:cubicBezTo>
+                    <a:close/>
+                  </a:path>
+                </a:pathLst>
+              </a:custGeom>
+              <a:solidFill>
+                <a:schemeClr val="accent3">
+                  <a:lumMod val="50000"/>
+                </a:schemeClr>
+              </a:solidFill>
+              <a:ln>
+                <a:noFill/>
+              </a:ln>
+            </p:spPr>
+            <p:style>
+              <a:lnRef idx="2">
+                <a:schemeClr val="accent1">
+                  <a:shade val="50000"/>
+                </a:schemeClr>
+              </a:lnRef>
+              <a:fillRef idx="1">
+                <a:schemeClr val="accent1"/>
+              </a:fillRef>
+              <a:effectRef idx="0">
+                <a:schemeClr val="accent1"/>
+              </a:effectRef>
+              <a:fontRef idx="minor">
+                <a:schemeClr val="lt1"/>
+              </a:fontRef>
+            </p:style>
+            <p:txBody>
+              <a:bodyPr rtlCol="0" anchor="ctr"/>
+              <a:lstStyle/>
+              <a:p>
+                <a:pPr algn="ctr"/>
+                <a:endParaRPr lang="pt-BR" u="sng"/>
+              </a:p>
+            </p:txBody>
+          </p:sp>
+          <p:sp>
+            <p:nvSpPr>
+              <p:cNvPr id="14" name="Retângulo de cantos arredondados 13"/>
+              <p:cNvSpPr/>
+              <p:nvPr/>
+            </p:nvSpPr>
+            <p:spPr>
+              <a:xfrm>
+                <a:off x="6030743" y="2132036"/>
+                <a:ext cx="497395" cy="576884"/>
+              </a:xfrm>
+              <a:custGeom>
+                <a:avLst/>
+                <a:gdLst/>
+                <a:ahLst/>
+                <a:cxnLst/>
+                <a:rect l="l" t="t" r="r" b="b"/>
+                <a:pathLst>
+                  <a:path w="497395" h="576884">
+                    <a:moveTo>
+                      <a:pt x="154889" y="0"/>
+                    </a:moveTo>
+                    <a:lnTo>
+                      <a:pt x="235166" y="111232"/>
+                    </a:lnTo>
+                    <a:lnTo>
+                      <a:pt x="180860" y="132745"/>
+                    </a:lnTo>
+                    <a:lnTo>
+                      <a:pt x="346689" y="289062"/>
+                    </a:lnTo>
+                    <a:lnTo>
+                      <a:pt x="292382" y="315165"/>
+                    </a:lnTo>
+                    <a:lnTo>
+                      <a:pt x="497395" y="576884"/>
+                    </a:lnTo>
+                    <a:lnTo>
+                      <a:pt x="149717" y="376312"/>
+                    </a:lnTo>
+                    <a:lnTo>
+                      <a:pt x="216024" y="348469"/>
+                    </a:lnTo>
+                    <a:lnTo>
+                      <a:pt x="0" y="219994"/>
+                    </a:lnTo>
+                    <a:lnTo>
+                      <a:pt x="77409" y="180300"/>
+                    </a:lnTo>
+                    <a:lnTo>
+                      <a:pt x="6291" y="138277"/>
+                    </a:lnTo>
+                    <a:cubicBezTo>
+                      <a:pt x="47718" y="84200"/>
+                      <a:pt x="98362" y="38150"/>
+                      <a:pt x="154889" y="0"/>
+                    </a:cubicBezTo>
+                    <a:close/>
+                  </a:path>
+                </a:pathLst>
+              </a:custGeom>
+              <a:solidFill>
+                <a:schemeClr val="bg1">
+                  <a:lumMod val="85000"/>
+                </a:schemeClr>
+              </a:solidFill>
+              <a:ln>
+                <a:noFill/>
+              </a:ln>
+            </p:spPr>
+            <p:style>
+              <a:lnRef idx="2">
+                <a:schemeClr val="accent1">
+                  <a:shade val="50000"/>
+                </a:schemeClr>
+              </a:lnRef>
+              <a:fillRef idx="1">
+                <a:schemeClr val="accent1"/>
+              </a:fillRef>
+              <a:effectRef idx="0">
+                <a:schemeClr val="accent1"/>
+              </a:effectRef>
+              <a:fontRef idx="minor">
+                <a:schemeClr val="lt1"/>
+              </a:fontRef>
+            </p:style>
+            <p:txBody>
+              <a:bodyPr rtlCol="0" anchor="ctr"/>
+              <a:lstStyle/>
+              <a:p>
+                <a:pPr algn="ctr"/>
+                <a:endParaRPr lang="pt-BR"/>
+              </a:p>
+            </p:txBody>
+          </p:sp>
+        </p:grpSp>
         <p:sp>
           <p:nvSpPr>
-            <p:cNvPr id="8" name="Elipse 7"/>
-            <p:cNvSpPr/>
+            <p:cNvPr id="11" name="CaixaDeTexto 10"/>
+            <p:cNvSpPr txBox="1"/>
             <p:nvPr/>
           </p:nvSpPr>
           <p:spPr>
             <a:xfrm>
-              <a:off x="6692456" y="2794836"/>
-              <a:ext cx="1080120" cy="633772"/>
+              <a:off x="6123971" y="2092524"/>
+              <a:ext cx="875561" cy="830997"/>
             </a:xfrm>
-            <a:custGeom>
+            <a:prstGeom prst="rect">
               <a:avLst/>
-              <a:gdLst/>
-              <a:ahLst/>
-              <a:cxnLst/>
-              <a:rect l="l" t="t" r="r" b="b"/>
-              <a:pathLst>
-                <a:path w="1080120" h="633772">
-                  <a:moveTo>
-                    <a:pt x="540060" y="0"/>
-                  </a:moveTo>
-                  <a:cubicBezTo>
-                    <a:pt x="838327" y="0"/>
-                    <a:pt x="1080120" y="241793"/>
-                    <a:pt x="1080120" y="540060"/>
-                  </a:cubicBezTo>
-                  <a:lnTo>
-                    <a:pt x="1070673" y="633772"/>
-                  </a:lnTo>
-                  <a:lnTo>
-                    <a:pt x="9447" y="633772"/>
-                  </a:lnTo>
-                  <a:cubicBezTo>
-                    <a:pt x="2791" y="603492"/>
-                    <a:pt x="0" y="572102"/>
-                    <a:pt x="0" y="540060"/>
-                  </a:cubicBezTo>
-                  <a:cubicBezTo>
-                    <a:pt x="0" y="241793"/>
-                    <a:pt x="241793" y="0"/>
-                    <a:pt x="540060" y="0"/>
-                  </a:cubicBezTo>
-                  <a:close/>
-                </a:path>
-              </a:pathLst>
-            </a:custGeom>
-            <a:solidFill>
-              <a:schemeClr val="accent3">
-                <a:lumMod val="50000"/>
-              </a:schemeClr>
-            </a:solidFill>
-            <a:ln>
-              <a:noFill/>
-            </a:ln>
+            </a:prstGeom>
+            <a:noFill/>
           </p:spPr>
-          <p:style>
-            <a:lnRef idx="2">
-              <a:schemeClr val="accent1">
-                <a:shade val="50000"/>
-              </a:schemeClr>
-            </a:lnRef>
-            <a:fillRef idx="1">
-              <a:schemeClr val="accent1"/>
-            </a:fillRef>
-            <a:effectRef idx="0">
-              <a:schemeClr val="accent1"/>
-            </a:effectRef>
-            <a:fontRef idx="minor">
-              <a:schemeClr val="lt1"/>
-            </a:fontRef>
-          </p:style>
           <p:txBody>
-            <a:bodyPr rtlCol="0" anchor="ctr"/>
+            <a:bodyPr wrap="none" rtlCol="0">
+              <a:spAutoFit/>
+            </a:bodyPr>
             <a:lstStyle/>
             <a:p>
-              <a:pPr algn="ctr"/>
-              <a:endParaRPr lang="pt-BR" u="sng"/>
-            </a:p>
-          </p:txBody>
-        </p:sp>
-        <p:sp>
-          <p:nvSpPr>
-            <p:cNvPr id="9" name="Elipse 8"/>
-            <p:cNvSpPr/>
-            <p:nvPr/>
-          </p:nvSpPr>
-          <p:spPr>
-            <a:xfrm>
-              <a:off x="7235454" y="3077344"/>
-              <a:ext cx="1008780" cy="351656"/>
-            </a:xfrm>
-            <a:custGeom>
-              <a:avLst/>
-              <a:gdLst/>
-              <a:ahLst/>
-              <a:cxnLst/>
-              <a:rect l="l" t="t" r="r" b="b"/>
-              <a:pathLst>
-                <a:path w="1008780" h="351656">
-                  <a:moveTo>
-                    <a:pt x="504390" y="0"/>
-                  </a:moveTo>
-                  <a:cubicBezTo>
-                    <a:pt x="736157" y="0"/>
-                    <a:pt x="933824" y="145994"/>
-                    <a:pt x="1008780" y="351656"/>
-                  </a:cubicBezTo>
-                  <a:lnTo>
-                    <a:pt x="0" y="351656"/>
-                  </a:lnTo>
-                  <a:cubicBezTo>
-                    <a:pt x="74956" y="145994"/>
-                    <a:pt x="272624" y="0"/>
-                    <a:pt x="504390" y="0"/>
-                  </a:cubicBezTo>
-                  <a:close/>
-                </a:path>
-              </a:pathLst>
-            </a:custGeom>
-            <a:solidFill>
-              <a:schemeClr val="accent3">
-                <a:lumMod val="50000"/>
-              </a:schemeClr>
-            </a:solidFill>
-            <a:ln>
-              <a:noFill/>
-            </a:ln>
-          </p:spPr>
-          <p:style>
-            <a:lnRef idx="2">
-              <a:schemeClr val="accent1">
-                <a:shade val="50000"/>
-              </a:schemeClr>
-            </a:lnRef>
-            <a:fillRef idx="1">
-              <a:schemeClr val="accent1"/>
-            </a:fillRef>
-            <a:effectRef idx="0">
-              <a:schemeClr val="accent1"/>
-            </a:effectRef>
-            <a:fontRef idx="minor">
-              <a:schemeClr val="lt1"/>
-            </a:fontRef>
-          </p:style>
-          <p:txBody>
-            <a:bodyPr rtlCol="0" anchor="ctr"/>
-            <a:lstStyle/>
-            <a:p>
-              <a:pPr algn="ctr"/>
-              <a:endParaRPr lang="pt-BR" u="sng"/>
+              <a:r>
+                <a:rPr lang="pt-BR" sz="4800" b="1" dirty="0" smtClean="0">
+                  <a:latin typeface="Agency FB" panose="020B0503020202020204" pitchFamily="34" charset="0"/>
+                </a:rPr>
+                <a:t>RIP</a:t>
+              </a:r>
+              <a:endParaRPr lang="pt-BR" sz="2000" b="1" dirty="0">
+                <a:latin typeface="Agency FB" panose="020B0503020202020204" pitchFamily="34" charset="0"/>
+              </a:endParaRPr>
             </a:p>
           </p:txBody>
         </p:sp>

</xml_diff>